<commit_message>
maybe less of a mistake ?
</commit_message>
<xml_diff>
--- a/sys_LastSeenAlive-IW.pptx
+++ b/sys_LastSeenAlive-IW.pptx
@@ -109,7 +109,7 @@
   </p:defaultTextStyle>
   <p:extLst>
     <p:ext uri="{EFAFB233-063F-42B5-8137-9DF3F51BA10A}">
-      <p15:sldGuideLst xmlns:p15="http://schemas.microsoft.com/office/powerpoint/2012/main" xmlns="">
+      <p15:sldGuideLst xmlns="" xmlns:p15="http://schemas.microsoft.com/office/powerpoint/2012/main">
         <p15:guide id="1" orient="horz" pos="2880">
           <p15:clr>
             <a:srgbClr val="A4A3A4"/>
@@ -131,7 +131,7 @@
   <p:cmAuthor id="1" name="Isabel Winney" initials="IW" lastIdx="4" clrIdx="0">
     <p:extLst/>
   </p:cmAuthor>
-  <p:cmAuthor id="2" name="Malika" initials="MI" lastIdx="5" clrIdx="1"/>
+  <p:cmAuthor id="2" name="Malika" initials="MI" lastIdx="6" clrIdx="1"/>
 </p:cmAuthorLst>
 </file>
 
@@ -183,6 +183,10 @@
   <p:cm authorId="2" dt="2015-11-24T16:14:25.652" idx="5">
     <p:pos x="3632" y="4420"/>
     <p:text>definitively</p:text>
+  </p:cm>
+  <p:cm authorId="2" dt="2016-03-14T13:19:24.687" idx="6">
+    <p:pos x="4086" y="1082"/>
+    <p:text>in fact, all clutches (but 3) that has event number 4 (first seen), have at least an estimated hatching date</p:text>
   </p:cm>
 </p:cmLst>
 </file>
@@ -5740,137 +5744,137 @@
     </dgm:pt>
   </dgm:ptLst>
   <dgm:cxnLst>
+    <dgm:cxn modelId="{37C14AE7-AFE3-45E8-AA6E-AE19EE38716C}" type="presOf" srcId="{5A7580D2-0209-4D98-B1A6-14A092E99EBB}" destId="{98939E40-40D1-46E9-B543-DE720A796892}" srcOrd="0" destOrd="0" presId="urn:microsoft.com/office/officeart/2009/3/layout/HorizontalOrganizationChart"/>
+    <dgm:cxn modelId="{C91080C0-3526-4569-99C8-FAD8B7D89C91}" type="presOf" srcId="{857DA822-E89F-49E3-9558-BC9A614B7B2E}" destId="{97A3608D-ECAF-4DA5-8FB3-865360520BFE}" srcOrd="1" destOrd="0" presId="urn:microsoft.com/office/officeart/2009/3/layout/HorizontalOrganizationChart"/>
+    <dgm:cxn modelId="{2773BBE6-651A-41F2-8FF5-3867CA667280}" srcId="{857DA822-E89F-49E3-9558-BC9A614B7B2E}" destId="{F8D70772-4A77-4E16-80CB-DA089D5EFA19}" srcOrd="2" destOrd="0" parTransId="{5C76DD75-D8BF-4C6E-8ED8-E77FD6A240DB}" sibTransId="{AF6365C0-5671-401C-BC2B-575E9EE10992}"/>
+    <dgm:cxn modelId="{40483720-EA5E-4185-B30C-CAE371DBE588}" type="presOf" srcId="{41A7C6A1-347E-4A4E-A3F1-9B2E9FF60B80}" destId="{F979E834-769E-40DA-B841-1A84B33AAEB6}" srcOrd="0" destOrd="0" presId="urn:microsoft.com/office/officeart/2009/3/layout/HorizontalOrganizationChart"/>
+    <dgm:cxn modelId="{0572CAA6-8CD0-421A-AC07-72DB93E7BC9A}" type="presOf" srcId="{99787B07-3905-42FE-9431-603E6EC4AF44}" destId="{D4B78E75-2789-43F4-9EF0-B0B7AD3BE78D}" srcOrd="0" destOrd="0" presId="urn:microsoft.com/office/officeart/2009/3/layout/HorizontalOrganizationChart"/>
+    <dgm:cxn modelId="{8BF3E28C-DDAD-46A9-B816-CE12FC238439}" type="presOf" srcId="{C09133D0-FEE3-4845-BA79-F04FA509353C}" destId="{02C78742-6371-4A6C-970E-C8BFA6811453}" srcOrd="0" destOrd="0" presId="urn:microsoft.com/office/officeart/2009/3/layout/HorizontalOrganizationChart"/>
+    <dgm:cxn modelId="{EAE10DDA-DBC7-4DC2-9545-8E42FEB5AB6B}" type="presOf" srcId="{6B91BE19-7F7E-41EE-8F8A-2F1A8D240D4C}" destId="{DD1A71F8-D933-4FFC-ACA6-6A3E648602E9}" srcOrd="1" destOrd="0" presId="urn:microsoft.com/office/officeart/2009/3/layout/HorizontalOrganizationChart"/>
+    <dgm:cxn modelId="{0A3ECA5D-03A6-422A-B964-A6E7DEE8A393}" type="presOf" srcId="{09510EC8-ECC5-4BAF-9CD7-F9BB40FF34B0}" destId="{D43AE39C-CD89-460F-A4BA-01CA5A27EBA2}" srcOrd="0" destOrd="0" presId="urn:microsoft.com/office/officeart/2009/3/layout/HorizontalOrganizationChart"/>
+    <dgm:cxn modelId="{55039C6F-A073-4172-89FB-7782AB668B9E}" type="presOf" srcId="{D2FDD989-C301-42BB-B394-7246D212EA08}" destId="{8CFE662F-F699-4FA0-93BA-75BAC7617AD2}" srcOrd="0" destOrd="0" presId="urn:microsoft.com/office/officeart/2009/3/layout/HorizontalOrganizationChart"/>
+    <dgm:cxn modelId="{B958F64C-8BE7-457E-8F22-21DB67477B82}" type="presOf" srcId="{78CC48EC-45BA-46FE-9542-E311EC77FAAB}" destId="{2D4F4555-AEB8-4812-B592-37BE3AF93618}" srcOrd="0" destOrd="0" presId="urn:microsoft.com/office/officeart/2009/3/layout/HorizontalOrganizationChart"/>
+    <dgm:cxn modelId="{F9B39CDA-C7A9-4104-985A-2111EC91FABA}" type="presOf" srcId="{8D73D8C2-DE10-40A8-BDEC-4778DEAA1CA2}" destId="{4321AD13-1A8A-4AFE-B72B-E6BEC196FA0E}" srcOrd="0" destOrd="0" presId="urn:microsoft.com/office/officeart/2009/3/layout/HorizontalOrganizationChart"/>
+    <dgm:cxn modelId="{8BD9748B-8582-4E97-95AC-8ECB23B017F0}" type="presOf" srcId="{FB4FB845-B5E1-4676-A9C9-FDF074DB573D}" destId="{1C29CDBB-EDE3-4B4F-AF54-49C9BE70E8DA}" srcOrd="0" destOrd="0" presId="urn:microsoft.com/office/officeart/2009/3/layout/HorizontalOrganizationChart"/>
+    <dgm:cxn modelId="{5ECCDF9D-CBDB-4154-9086-5933F5E870C6}" srcId="{70364DBF-CEA7-4122-A7A8-502E918520A8}" destId="{DA0E7F61-8CD2-4D62-9A33-D24EFE4EF341}" srcOrd="0" destOrd="0" parTransId="{9A4C57C1-58E0-4187-97BA-FCFEB182559D}" sibTransId="{350CF987-825C-4687-A4DA-ED6E85296510}"/>
+    <dgm:cxn modelId="{289DA290-9482-4BE1-AB3D-3B3602B9AF67}" type="presOf" srcId="{AE155577-13EB-4D2B-AD53-FB46DA52F5DF}" destId="{96E4140D-7BC6-4CF4-8A2E-30DA3C63051E}" srcOrd="0" destOrd="0" presId="urn:microsoft.com/office/officeart/2009/3/layout/HorizontalOrganizationChart"/>
+    <dgm:cxn modelId="{37282E2C-DCA9-4B2B-8076-8884EBD9FB2E}" type="presOf" srcId="{C9133969-69AB-43BE-BE31-E2D23F75069B}" destId="{1A3C7E37-2B37-4ED8-947E-C13ADF38B1BE}" srcOrd="0" destOrd="0" presId="urn:microsoft.com/office/officeart/2009/3/layout/HorizontalOrganizationChart"/>
+    <dgm:cxn modelId="{24D3B070-9D7B-40F6-97D2-0330B35A42E0}" type="presOf" srcId="{084F17B5-BA5A-4476-A651-84E34BBCBFA9}" destId="{47B74644-DD88-47F6-860E-854D8D841CBA}" srcOrd="0" destOrd="0" presId="urn:microsoft.com/office/officeart/2009/3/layout/HorizontalOrganizationChart"/>
+    <dgm:cxn modelId="{78B5FC93-7AE0-4407-92F7-E7B6323ABA41}" type="presOf" srcId="{4C4EB091-2B04-44AE-BB38-67DF49C72E65}" destId="{2DAE2D84-5114-4304-828A-93079DF6847A}" srcOrd="0" destOrd="0" presId="urn:microsoft.com/office/officeart/2009/3/layout/HorizontalOrganizationChart"/>
+    <dgm:cxn modelId="{F03DCA6B-6838-4395-A403-FE3D67D984E0}" type="presOf" srcId="{488F7D39-E327-4B3F-89C4-E40489C3D624}" destId="{A560513C-F005-4BFB-BDCA-1A3FC2BE876D}" srcOrd="1" destOrd="0" presId="urn:microsoft.com/office/officeart/2009/3/layout/HorizontalOrganizationChart"/>
+    <dgm:cxn modelId="{6F0946B9-B66E-4B3E-9CB7-39869152996F}" srcId="{F8D70772-4A77-4E16-80CB-DA089D5EFA19}" destId="{857EF621-5CDD-4F51-A806-B7214BE7377B}" srcOrd="3" destOrd="0" parTransId="{6564ABAF-575A-44BE-9CC6-92EB36279CEE}" sibTransId="{E6C2CA4D-FFA8-446B-B309-B8AFF378B57E}"/>
+    <dgm:cxn modelId="{75368CE1-1DE2-4A88-9FE3-528D52BF4EB7}" type="presOf" srcId="{88EFA125-05CC-43FF-9382-13FC646F67B2}" destId="{CADC30DF-8160-4509-8C15-BF7632A67781}" srcOrd="0" destOrd="0" presId="urn:microsoft.com/office/officeart/2009/3/layout/HorizontalOrganizationChart"/>
+    <dgm:cxn modelId="{0AAF3040-5330-4BA4-9382-C4EC67C98326}" srcId="{F8D70772-4A77-4E16-80CB-DA089D5EFA19}" destId="{88EFA125-05CC-43FF-9382-13FC646F67B2}" srcOrd="2" destOrd="0" parTransId="{5A7580D2-0209-4D98-B1A6-14A092E99EBB}" sibTransId="{95BAAD03-6602-4822-AF8D-CBAEE9977A9F}"/>
+    <dgm:cxn modelId="{CDA9ABAB-C1DB-4BF2-A1D2-BB196592185A}" type="presOf" srcId="{A0B61847-E55C-4873-966C-9AA2A02EC1BE}" destId="{1194A3D7-9610-48C4-81E2-1F82969AD204}" srcOrd="1" destOrd="0" presId="urn:microsoft.com/office/officeart/2009/3/layout/HorizontalOrganizationChart"/>
+    <dgm:cxn modelId="{5ABE55BC-0772-40C7-8686-08171BF5C5F9}" type="presOf" srcId="{70364DBF-CEA7-4122-A7A8-502E918520A8}" destId="{667D49AF-D100-4413-B3EF-87574DAD72B6}" srcOrd="0" destOrd="0" presId="urn:microsoft.com/office/officeart/2009/3/layout/HorizontalOrganizationChart"/>
+    <dgm:cxn modelId="{9A8FA642-CDE7-470B-ABF4-BC672FE5B144}" type="presOf" srcId="{78CC48EC-45BA-46FE-9542-E311EC77FAAB}" destId="{49E879AF-E004-46F6-80DA-D3252100B65C}" srcOrd="1" destOrd="0" presId="urn:microsoft.com/office/officeart/2009/3/layout/HorizontalOrganizationChart"/>
+    <dgm:cxn modelId="{0705355B-5A08-453B-B0B1-BEA09EB6F738}" type="presOf" srcId="{09510EC8-ECC5-4BAF-9CD7-F9BB40FF34B0}" destId="{25BCE98E-3317-426C-A272-FDB9F5F357D8}" srcOrd="1" destOrd="0" presId="urn:microsoft.com/office/officeart/2009/3/layout/HorizontalOrganizationChart"/>
+    <dgm:cxn modelId="{5909351D-4CE3-4CE3-B459-EE8AB92CE13C}" type="presOf" srcId="{E18A83E2-B09C-4433-9767-D861EC35EE4D}" destId="{CBBDDF41-DFC8-4D90-8AC3-6F81F1CED4F8}" srcOrd="0" destOrd="0" presId="urn:microsoft.com/office/officeart/2009/3/layout/HorizontalOrganizationChart"/>
+    <dgm:cxn modelId="{6A15A473-DA83-4679-B244-CE033B71849C}" type="presOf" srcId="{6B91BE19-7F7E-41EE-8F8A-2F1A8D240D4C}" destId="{0ABED88C-6E89-49FE-B81D-588196E271AF}" srcOrd="0" destOrd="0" presId="urn:microsoft.com/office/officeart/2009/3/layout/HorizontalOrganizationChart"/>
+    <dgm:cxn modelId="{F41CCE5A-1DFC-4826-A357-98CE8A40F5AD}" type="presOf" srcId="{ED3AECD0-84CA-485F-A652-BAFD791EA92C}" destId="{532FAAFB-C773-4E28-8E51-ED5CAD7939FF}" srcOrd="1" destOrd="0" presId="urn:microsoft.com/office/officeart/2009/3/layout/HorizontalOrganizationChart"/>
+    <dgm:cxn modelId="{8754E8A3-33C2-4E11-86CE-5195B0186635}" type="presOf" srcId="{05CE3A32-3FE4-44BC-9178-1254A9E9480D}" destId="{34A20C63-4852-43BF-9A21-25F9C8F93219}" srcOrd="0" destOrd="0" presId="urn:microsoft.com/office/officeart/2009/3/layout/HorizontalOrganizationChart"/>
+    <dgm:cxn modelId="{9C68EFC6-3F2F-48FF-AB47-8640CC904C5D}" srcId="{78CC48EC-45BA-46FE-9542-E311EC77FAAB}" destId="{05CE3A32-3FE4-44BC-9178-1254A9E9480D}" srcOrd="1" destOrd="0" parTransId="{C0CD9D81-9BCB-491F-BE0D-6994DEAFDDD4}" sibTransId="{7E6C0FDD-8108-4218-B1C9-A905C5D62A9B}"/>
+    <dgm:cxn modelId="{00BE15CC-BBB2-43AB-B2EC-99D60D92B366}" type="presOf" srcId="{DA0E7F61-8CD2-4D62-9A33-D24EFE4EF341}" destId="{404837D6-5C85-4556-81FB-14CDC26505D7}" srcOrd="1" destOrd="0" presId="urn:microsoft.com/office/officeart/2009/3/layout/HorizontalOrganizationChart"/>
+    <dgm:cxn modelId="{1E00F568-A4BC-44CF-A22F-65E21A9F548E}" type="presOf" srcId="{E619505B-0727-4AD9-94DD-27734312B4D2}" destId="{9C093E2C-D988-4786-8BA4-E99EFD30835A}" srcOrd="0" destOrd="0" presId="urn:microsoft.com/office/officeart/2009/3/layout/HorizontalOrganizationChart"/>
+    <dgm:cxn modelId="{0EC40B32-2B49-4FE8-8DDE-86F9AF5E098E}" type="presOf" srcId="{9E08F495-C4AE-4F28-A386-0A8DEFC6BBBD}" destId="{4BFFA2CA-E21D-4504-B491-1C36FBB2731E}" srcOrd="0" destOrd="0" presId="urn:microsoft.com/office/officeart/2009/3/layout/HorizontalOrganizationChart"/>
+    <dgm:cxn modelId="{A2CF1A33-9E1C-4B2B-9C78-D9342E6315D9}" type="presOf" srcId="{2ECD8A08-DF71-40FA-A01B-F586233FBA82}" destId="{D64E57E3-756D-4B66-9928-DCC8934D02D7}" srcOrd="0" destOrd="0" presId="urn:microsoft.com/office/officeart/2009/3/layout/HorizontalOrganizationChart"/>
+    <dgm:cxn modelId="{01DDFCE3-4233-4054-9269-1843DAA58239}" type="presOf" srcId="{4BE2BFC7-1572-45B6-983B-0818696CEC95}" destId="{7286CFC7-97E1-4952-9B18-BFF104CDB62D}" srcOrd="1" destOrd="0" presId="urn:microsoft.com/office/officeart/2009/3/layout/HorizontalOrganizationChart"/>
+    <dgm:cxn modelId="{1CBF92F1-E5CB-4D3C-B802-C0AB3B6F900D}" type="presOf" srcId="{46D4813D-F9B3-4F97-B23C-21E011030F41}" destId="{6C2EF6F4-C505-4353-AD5E-0C36EB1A1F9C}" srcOrd="0" destOrd="0" presId="urn:microsoft.com/office/officeart/2009/3/layout/HorizontalOrganizationChart"/>
+    <dgm:cxn modelId="{EF6AB380-30D1-44C7-B056-FF3F9B01E8C7}" srcId="{F8D70772-4A77-4E16-80CB-DA089D5EFA19}" destId="{78CC48EC-45BA-46FE-9542-E311EC77FAAB}" srcOrd="1" destOrd="0" parTransId="{0EB40DEC-AB4B-423C-817F-A3FA48937BB2}" sibTransId="{4324AC2F-8964-4125-9517-0516F218221C}"/>
+    <dgm:cxn modelId="{804C8811-8501-4F4A-B54E-0A20992DF50D}" type="presOf" srcId="{FD406D31-5931-4646-8C71-73B4CF38DCC1}" destId="{5291B87A-FB1B-4C43-B091-59599DD56257}" srcOrd="1" destOrd="0" presId="urn:microsoft.com/office/officeart/2009/3/layout/HorizontalOrganizationChart"/>
+    <dgm:cxn modelId="{C71084A0-9E15-4DB4-B578-27202FE71689}" type="presOf" srcId="{054C8CB1-F3F9-4F5B-9CC5-EDD68CD3F5A9}" destId="{121EC69E-79BD-40CF-B9EF-2F16E0CE0374}" srcOrd="0" destOrd="0" presId="urn:microsoft.com/office/officeart/2009/3/layout/HorizontalOrganizationChart"/>
+    <dgm:cxn modelId="{8C1B2F56-D24C-4767-92E0-EF8C54659217}" type="presOf" srcId="{E099E485-8033-4922-9849-AD5E12FD1FFE}" destId="{81757558-ECB3-484A-B2D0-4AFACC3C5964}" srcOrd="0" destOrd="0" presId="urn:microsoft.com/office/officeart/2009/3/layout/HorizontalOrganizationChart"/>
+    <dgm:cxn modelId="{A9B097F5-1C82-4788-811A-7EF68FC7E2EB}" type="presOf" srcId="{FD406D31-5931-4646-8C71-73B4CF38DCC1}" destId="{AA9C057E-CBC1-421A-B365-30A870B00142}" srcOrd="0" destOrd="0" presId="urn:microsoft.com/office/officeart/2009/3/layout/HorizontalOrganizationChart"/>
+    <dgm:cxn modelId="{B8577C21-D52D-4E35-8EFF-D8B5568757EF}" type="presOf" srcId="{F8D70772-4A77-4E16-80CB-DA089D5EFA19}" destId="{F0AEE5F4-186A-4EA5-9B88-8B7EC4C6D1CE}" srcOrd="1" destOrd="0" presId="urn:microsoft.com/office/officeart/2009/3/layout/HorizontalOrganizationChart"/>
+    <dgm:cxn modelId="{8C18E370-67BA-451B-9247-B055CE0AC30D}" srcId="{857DA822-E89F-49E3-9558-BC9A614B7B2E}" destId="{488F7D39-E327-4B3F-89C4-E40489C3D624}" srcOrd="3" destOrd="0" parTransId="{81E6A6A1-9CDF-404E-BF9F-958F8899BF8E}" sibTransId="{A669E452-6723-4D2C-AD68-A23A2A933A7F}"/>
+    <dgm:cxn modelId="{16AA8561-D560-4146-AB36-17E2D9F8F02E}" srcId="{875D4011-7CFD-448C-A3CC-4436BCC3F09E}" destId="{8ECA2497-3DC6-4A44-8884-CA5E84A50CD2}" srcOrd="1" destOrd="0" parTransId="{FB4FB845-B5E1-4676-A9C9-FDF074DB573D}" sibTransId="{FEBB23C4-6D8D-4A20-9C96-C885227EF16F}"/>
+    <dgm:cxn modelId="{29A4B019-4974-495E-8105-263A1AD316DC}" srcId="{C9133969-69AB-43BE-BE31-E2D23F75069B}" destId="{67FB990C-EB07-4588-AD60-DFDD89551563}" srcOrd="0" destOrd="0" parTransId="{084F17B5-BA5A-4476-A651-84E34BBCBFA9}" sibTransId="{2B718C83-E80D-488C-8C26-11ECA76883D4}"/>
+    <dgm:cxn modelId="{BFAD1E37-4448-46C0-A2A3-5CEE64E06C6A}" srcId="{41A7C6A1-347E-4A4E-A3F1-9B2E9FF60B80}" destId="{8D73D8C2-DE10-40A8-BDEC-4778DEAA1CA2}" srcOrd="0" destOrd="0" parTransId="{CDBF7332-6205-4D52-B388-9C190B4B867B}" sibTransId="{F9B78F6C-F481-42C1-A40E-9C5DAC1994EE}"/>
+    <dgm:cxn modelId="{C795A451-59C0-49D9-8DA9-D743FAF49CAB}" type="presOf" srcId="{5CCA39A5-AA43-421B-A4AC-6D3F5F939833}" destId="{9C460B25-69F1-4173-BEC0-A497C12DC964}" srcOrd="0" destOrd="0" presId="urn:microsoft.com/office/officeart/2009/3/layout/HorizontalOrganizationChart"/>
+    <dgm:cxn modelId="{4B078CC0-2443-4329-8A02-DFD50B6B34A6}" srcId="{78CC48EC-45BA-46FE-9542-E311EC77FAAB}" destId="{C09133D0-FEE3-4845-BA79-F04FA509353C}" srcOrd="2" destOrd="0" parTransId="{9E08F495-C4AE-4F28-A386-0A8DEFC6BBBD}" sibTransId="{5014C75D-6816-4098-B900-06692FD04FCB}"/>
+    <dgm:cxn modelId="{D8A452D1-1BB8-4734-80DD-10A442A7393F}" type="presOf" srcId="{05CE3A32-3FE4-44BC-9178-1254A9E9480D}" destId="{92350E8A-A643-42D5-9553-30F1554A29E8}" srcOrd="1" destOrd="0" presId="urn:microsoft.com/office/officeart/2009/3/layout/HorizontalOrganizationChart"/>
+    <dgm:cxn modelId="{58352E97-24B3-425C-AFB0-6B918415ED24}" type="presOf" srcId="{41A7C6A1-347E-4A4E-A3F1-9B2E9FF60B80}" destId="{BA82972F-9D04-460C-8288-A84780A3B71B}" srcOrd="1" destOrd="0" presId="urn:microsoft.com/office/officeart/2009/3/layout/HorizontalOrganizationChart"/>
+    <dgm:cxn modelId="{6FD1A898-6297-4DF3-8754-CC5E9E56EE9D}" type="presOf" srcId="{83CAD8EA-F457-4ACB-B70D-7A0706565D8F}" destId="{52BF0315-0702-4273-8372-E39BDD09B0D8}" srcOrd="0" destOrd="0" presId="urn:microsoft.com/office/officeart/2009/3/layout/HorizontalOrganizationChart"/>
+    <dgm:cxn modelId="{87182C79-B855-41D7-8C0C-7DF4858FC396}" type="presOf" srcId="{5C76DD75-D8BF-4C6E-8ED8-E77FD6A240DB}" destId="{5A8C21F3-F6F4-4DF1-A699-E06FD7641312}" srcOrd="0" destOrd="0" presId="urn:microsoft.com/office/officeart/2009/3/layout/HorizontalOrganizationChart"/>
+    <dgm:cxn modelId="{D67941B2-99D4-4F9A-BA7F-3FBA617FF199}" type="presOf" srcId="{6564ABAF-575A-44BE-9CC6-92EB36279CEE}" destId="{A31EE17D-D7AD-4F4B-AB05-3523EB0B6328}" srcOrd="0" destOrd="0" presId="urn:microsoft.com/office/officeart/2009/3/layout/HorizontalOrganizationChart"/>
+    <dgm:cxn modelId="{86CD3A3B-0BFE-4EEE-9898-E7F56629DA31}" srcId="{875D4011-7CFD-448C-A3CC-4436BCC3F09E}" destId="{2ECD8A08-DF71-40FA-A01B-F586233FBA82}" srcOrd="0" destOrd="0" parTransId="{0D4A24D3-7319-4036-A144-BE7C0EDF29A9}" sibTransId="{AD52978E-DDAF-46D8-80BD-481F1FB0C937}"/>
+    <dgm:cxn modelId="{771D101C-D5F5-4422-8DF0-DAFFFE3931AE}" type="presOf" srcId="{81E6A6A1-9CDF-404E-BF9F-958F8899BF8E}" destId="{D580F8B9-D289-42B2-BECF-6B0A256C4CFC}" srcOrd="0" destOrd="0" presId="urn:microsoft.com/office/officeart/2009/3/layout/HorizontalOrganizationChart"/>
+    <dgm:cxn modelId="{D4CFA32D-293A-4107-BFC3-0F24E20AF9E6}" type="presOf" srcId="{C0CD9D81-9BCB-491F-BE0D-6994DEAFDDD4}" destId="{5DA9537E-9698-46A9-BDE0-4D03963D68AC}" srcOrd="0" destOrd="0" presId="urn:microsoft.com/office/officeart/2009/3/layout/HorizontalOrganizationChart"/>
+    <dgm:cxn modelId="{D48ACB70-633E-4930-8A17-2B0549DC7960}" type="presOf" srcId="{5CCA39A5-AA43-421B-A4AC-6D3F5F939833}" destId="{23234E9C-1EA6-423F-B4AC-FFCFBD865418}" srcOrd="1" destOrd="0" presId="urn:microsoft.com/office/officeart/2009/3/layout/HorizontalOrganizationChart"/>
+    <dgm:cxn modelId="{90599AB1-2CF7-480C-B95A-70B5F95B0E90}" type="presOf" srcId="{C9133969-69AB-43BE-BE31-E2D23F75069B}" destId="{1C7E8899-9442-47C0-ADE5-3606ED0FBA6E}" srcOrd="1" destOrd="0" presId="urn:microsoft.com/office/officeart/2009/3/layout/HorizontalOrganizationChart"/>
+    <dgm:cxn modelId="{903D939F-8CD7-4729-86AF-E4CE53E6E81C}" type="presOf" srcId="{ED3AECD0-84CA-485F-A652-BAFD791EA92C}" destId="{783755FC-7346-4329-A605-70D2EB09645F}" srcOrd="0" destOrd="0" presId="urn:microsoft.com/office/officeart/2009/3/layout/HorizontalOrganizationChart"/>
+    <dgm:cxn modelId="{40466397-9052-49E3-8D79-E96BC9C05C50}" type="presOf" srcId="{38968339-7F3A-46F7-A0DF-21D6E4D335F5}" destId="{4EF42A86-04CE-4D55-9010-010D37235E08}" srcOrd="0" destOrd="0" presId="urn:microsoft.com/office/officeart/2009/3/layout/HorizontalOrganizationChart"/>
+    <dgm:cxn modelId="{21D2B346-07C7-45E0-BAE4-921735753E49}" type="presOf" srcId="{C09133D0-FEE3-4845-BA79-F04FA509353C}" destId="{C21D1D00-37C7-497C-B84D-C843E4458E0F}" srcOrd="1" destOrd="0" presId="urn:microsoft.com/office/officeart/2009/3/layout/HorizontalOrganizationChart"/>
+    <dgm:cxn modelId="{7ACF9186-9C24-4D3B-8051-B02E3DD33737}" srcId="{857DA822-E89F-49E3-9558-BC9A614B7B2E}" destId="{F2970618-BA7D-4957-BDE5-4679B2612DD9}" srcOrd="1" destOrd="0" parTransId="{054C8CB1-F3F9-4F5B-9CC5-EDD68CD3F5A9}" sibTransId="{E4049438-3F76-49C8-A33B-B40929C5E9DC}"/>
+    <dgm:cxn modelId="{86374C38-9FEE-4CDA-82FC-421B2507E6C4}" type="presOf" srcId="{2ECD8A08-DF71-40FA-A01B-F586233FBA82}" destId="{AAC42A15-48A2-4C47-800E-B479AA8C0B2B}" srcOrd="1" destOrd="0" presId="urn:microsoft.com/office/officeart/2009/3/layout/HorizontalOrganizationChart"/>
+    <dgm:cxn modelId="{EBC48C2B-774C-49EF-B6B4-961BEE2601D2}" type="presOf" srcId="{88EFA125-05CC-43FF-9382-13FC646F67B2}" destId="{D46D03D3-2F03-40DD-B31E-9B301050E315}" srcOrd="1" destOrd="0" presId="urn:microsoft.com/office/officeart/2009/3/layout/HorizontalOrganizationChart"/>
+    <dgm:cxn modelId="{A0BE8432-2AF6-4B1E-A63D-10B7CD137587}" type="presOf" srcId="{8ECA2497-3DC6-4A44-8884-CA5E84A50CD2}" destId="{915EBF13-E9E0-4011-A880-DB1226B58929}" srcOrd="1" destOrd="0" presId="urn:microsoft.com/office/officeart/2009/3/layout/HorizontalOrganizationChart"/>
+    <dgm:cxn modelId="{F598C19F-A233-410E-8039-6909025D9C39}" srcId="{D2FDD989-C301-42BB-B394-7246D212EA08}" destId="{09510EC8-ECC5-4BAF-9CD7-F9BB40FF34B0}" srcOrd="0" destOrd="0" parTransId="{B0403523-48E6-4DE7-8C1E-667F1ACE87EC}" sibTransId="{94C51012-1DE1-4029-9CA8-288706995E0F}"/>
+    <dgm:cxn modelId="{776E581E-6409-43A4-9082-BBCC00B9D596}" type="presOf" srcId="{1F2D2D5A-A4D6-4B03-9170-1F846637717A}" destId="{21DC71C5-6535-4859-9380-E1ADC98C0E53}" srcOrd="0" destOrd="0" presId="urn:microsoft.com/office/officeart/2009/3/layout/HorizontalOrganizationChart"/>
     <dgm:cxn modelId="{FD0FBF2F-16E5-4B56-AA4D-4563594FA7C0}" type="presOf" srcId="{7165AC04-7DA8-4AF8-8BAE-CB741D3DE9B9}" destId="{04E88D25-A5A5-4898-9E6C-D4F36A121A27}" srcOrd="0" destOrd="0" presId="urn:microsoft.com/office/officeart/2009/3/layout/HorizontalOrganizationChart"/>
-    <dgm:cxn modelId="{00BE15CC-BBB2-43AB-B2EC-99D60D92B366}" type="presOf" srcId="{DA0E7F61-8CD2-4D62-9A33-D24EFE4EF341}" destId="{404837D6-5C85-4556-81FB-14CDC26505D7}" srcOrd="1" destOrd="0" presId="urn:microsoft.com/office/officeart/2009/3/layout/HorizontalOrganizationChart"/>
-    <dgm:cxn modelId="{66E770EB-7E4B-41F6-BE9F-E4228A2EBF5C}" type="presOf" srcId="{1CA840A3-55CA-473D-ADFD-D92BBF677443}" destId="{9244B12A-5D28-47B8-AF59-534D0A8FB625}" srcOrd="0" destOrd="0" presId="urn:microsoft.com/office/officeart/2009/3/layout/HorizontalOrganizationChart"/>
+    <dgm:cxn modelId="{9872F35A-B620-4C0B-B096-60F77ED0497F}" srcId="{857DA822-E89F-49E3-9558-BC9A614B7B2E}" destId="{F5CF903E-9F6D-4B9D-900F-7D5A2A6F5F66}" srcOrd="4" destOrd="0" parTransId="{8C578C9C-B54F-436D-BB12-96FC1AD615C2}" sibTransId="{80799540-5483-4DFC-AFDA-D9BE18B12E88}"/>
+    <dgm:cxn modelId="{601D2EA7-2E80-41B6-AF46-045D21CEE9E4}" srcId="{A0B61847-E55C-4873-966C-9AA2A02EC1BE}" destId="{41A7C6A1-347E-4A4E-A3F1-9B2E9FF60B80}" srcOrd="1" destOrd="0" parTransId="{00DEF4BA-F5A1-4D24-B210-1C39F1B35AE6}" sibTransId="{BD0AC525-A11F-4438-9557-F4F1B7C75C3E}"/>
+    <dgm:cxn modelId="{0D2E8580-79F7-4F03-94A2-7C496ECCE9A9}" type="presOf" srcId="{8D73D8C2-DE10-40A8-BDEC-4778DEAA1CA2}" destId="{FBA6D6F7-DEB3-496F-B1B3-EF2B502B70D2}" srcOrd="1" destOrd="0" presId="urn:microsoft.com/office/officeart/2009/3/layout/HorizontalOrganizationChart"/>
+    <dgm:cxn modelId="{7A15DA9D-2280-453D-8885-5E3880DB19FE}" srcId="{F5CF903E-9F6D-4B9D-900F-7D5A2A6F5F66}" destId="{1CA840A3-55CA-473D-ADFD-D92BBF677443}" srcOrd="3" destOrd="0" parTransId="{1F2D2D5A-A4D6-4B03-9170-1F846637717A}" sibTransId="{87F18AA1-9EA8-4E4E-8A3A-F2D97C95245B}"/>
+    <dgm:cxn modelId="{C6694A2F-C9D3-4B2B-9BB5-212C95F1B9B1}" type="presOf" srcId="{F2970618-BA7D-4957-BDE5-4679B2612DD9}" destId="{55A64C7D-2814-4720-A5C2-AFC77883D643}" srcOrd="1" destOrd="0" presId="urn:microsoft.com/office/officeart/2009/3/layout/HorizontalOrganizationChart"/>
+    <dgm:cxn modelId="{7C42EE38-45A4-4D75-AEB0-DE88B2450EB2}" type="presOf" srcId="{F8D70772-4A77-4E16-80CB-DA089D5EFA19}" destId="{38FDAF18-81E3-4DFF-BE63-082F9C4C72C4}" srcOrd="0" destOrd="0" presId="urn:microsoft.com/office/officeart/2009/3/layout/HorizontalOrganizationChart"/>
+    <dgm:cxn modelId="{86834B12-2CF7-4366-9029-BB5A7633FE73}" srcId="{F2970618-BA7D-4957-BDE5-4679B2612DD9}" destId="{0FF773E1-C96E-4AB1-B9A9-EF4CF8F907A4}" srcOrd="0" destOrd="0" parTransId="{63C451AF-0DE6-415D-A080-07A4496EE903}" sibTransId="{D96F5437-460D-48F3-AA08-3490752FBCB7}"/>
+    <dgm:cxn modelId="{2DD5758D-058E-4CC0-B9CC-B3F25B141488}" srcId="{F5CF903E-9F6D-4B9D-900F-7D5A2A6F5F66}" destId="{5CCA39A5-AA43-421B-A4AC-6D3F5F939833}" srcOrd="1" destOrd="0" parTransId="{6FD89FC4-35A8-4F97-A89E-9C325EA4E7A5}" sibTransId="{12459432-963E-4F50-B830-C2001FDC7B41}"/>
+    <dgm:cxn modelId="{95B1F43F-4FD1-4814-B8B2-6241EBFF0480}" type="presOf" srcId="{0D4A24D3-7319-4036-A144-BE7C0EDF29A9}" destId="{40E38535-02A1-4246-AFFC-70C91A6DD807}" srcOrd="0" destOrd="0" presId="urn:microsoft.com/office/officeart/2009/3/layout/HorizontalOrganizationChart"/>
+    <dgm:cxn modelId="{0C9DD8B2-7F84-41A3-8979-158555ABF84A}" type="presOf" srcId="{63C451AF-0DE6-415D-A080-07A4496EE903}" destId="{FF184EA5-E382-4318-94E3-990725729D5A}" srcOrd="0" destOrd="0" presId="urn:microsoft.com/office/officeart/2009/3/layout/HorizontalOrganizationChart"/>
+    <dgm:cxn modelId="{B1381AE2-821F-40B4-B5AC-103434228600}" type="presOf" srcId="{85B172ED-FE47-4C74-9C66-E4B49D3CE5FA}" destId="{21CF30C1-DF3B-42C2-81A8-3E38FFBF85D5}" srcOrd="1" destOrd="0" presId="urn:microsoft.com/office/officeart/2009/3/layout/HorizontalOrganizationChart"/>
+    <dgm:cxn modelId="{2A7D23F8-2660-431A-A0EF-F3EE04E23F49}" type="presOf" srcId="{99787B07-3905-42FE-9431-603E6EC4AF44}" destId="{F436D08A-73FA-4DFD-9773-81C476C08EA9}" srcOrd="1" destOrd="0" presId="urn:microsoft.com/office/officeart/2009/3/layout/HorizontalOrganizationChart"/>
+    <dgm:cxn modelId="{FFABEF9A-777B-4811-A989-DB29EE507CC6}" type="presOf" srcId="{A0B61847-E55C-4873-966C-9AA2A02EC1BE}" destId="{478518D4-7049-40F5-8308-260C6C349B43}" srcOrd="0" destOrd="0" presId="urn:microsoft.com/office/officeart/2009/3/layout/HorizontalOrganizationChart"/>
     <dgm:cxn modelId="{37AA3936-8587-4838-991D-5C0369A1B08A}" type="presOf" srcId="{8ECA2497-3DC6-4A44-8884-CA5E84A50CD2}" destId="{9EA0719D-3FE8-440C-A4AC-49422504A70E}" srcOrd="0" destOrd="0" presId="urn:microsoft.com/office/officeart/2009/3/layout/HorizontalOrganizationChart"/>
-    <dgm:cxn modelId="{6DED229A-DEA2-47DD-9842-5FBF8AC40B11}" type="presOf" srcId="{F2903B6D-F87B-43C6-9BDE-2C149D85246D}" destId="{54CF2207-67DE-4D65-BB58-DE7100F3A357}" srcOrd="0" destOrd="0" presId="urn:microsoft.com/office/officeart/2009/3/layout/HorizontalOrganizationChart"/>
-    <dgm:cxn modelId="{01DDFCE3-4233-4054-9269-1843DAA58239}" type="presOf" srcId="{4BE2BFC7-1572-45B6-983B-0818696CEC95}" destId="{7286CFC7-97E1-4952-9B18-BFF104CDB62D}" srcOrd="1" destOrd="0" presId="urn:microsoft.com/office/officeart/2009/3/layout/HorizontalOrganizationChart"/>
-    <dgm:cxn modelId="{C71084A0-9E15-4DB4-B578-27202FE71689}" type="presOf" srcId="{054C8CB1-F3F9-4F5B-9CC5-EDD68CD3F5A9}" destId="{121EC69E-79BD-40CF-B9EF-2F16E0CE0374}" srcOrd="0" destOrd="0" presId="urn:microsoft.com/office/officeart/2009/3/layout/HorizontalOrganizationChart"/>
+    <dgm:cxn modelId="{E6252A8D-EDB6-4F8F-AD57-AED7AF17281A}" srcId="{6B91BE19-7F7E-41EE-8F8A-2F1A8D240D4C}" destId="{ED3AECD0-84CA-485F-A652-BAFD791EA92C}" srcOrd="0" destOrd="0" parTransId="{46D4813D-F9B3-4F97-B23C-21E011030F41}" sibTransId="{A183C564-5415-46CA-B335-A94751411487}"/>
+    <dgm:cxn modelId="{CA7B993F-1C2C-4FAF-B41D-FBFA85C32EEF}" srcId="{88EFA125-05CC-43FF-9382-13FC646F67B2}" destId="{85B172ED-FE47-4C74-9C66-E4B49D3CE5FA}" srcOrd="0" destOrd="0" parTransId="{6B2C547E-A3E5-4BE3-86D7-AD5DCD637D4F}" sibTransId="{35891FFD-57D8-4071-A612-FCE0DD2E0F34}"/>
+    <dgm:cxn modelId="{D049A663-E2DE-48E4-9770-3B1FDC92E234}" type="presOf" srcId="{0FF773E1-C96E-4AB1-B9A9-EF4CF8F907A4}" destId="{716A296B-9DCB-4EFD-8F08-DB74E8215D67}" srcOrd="0" destOrd="0" presId="urn:microsoft.com/office/officeart/2009/3/layout/HorizontalOrganizationChart"/>
+    <dgm:cxn modelId="{34E1735A-9BDA-43DB-B88A-968F22254BFE}" type="presOf" srcId="{7165AC04-7DA8-4AF8-8BAE-CB741D3DE9B9}" destId="{7F0979D7-C0EB-41EC-9295-45B2ADB9FEFC}" srcOrd="1" destOrd="0" presId="urn:microsoft.com/office/officeart/2009/3/layout/HorizontalOrganizationChart"/>
+    <dgm:cxn modelId="{10104562-274A-4271-8132-799C4DC5E123}" type="presOf" srcId="{857EF621-5CDD-4F51-A806-B7214BE7377B}" destId="{157879C1-3523-421B-B20F-A0717CC4CA21}" srcOrd="0" destOrd="0" presId="urn:microsoft.com/office/officeart/2009/3/layout/HorizontalOrganizationChart"/>
+    <dgm:cxn modelId="{3829B7CE-5ED8-486B-A6E4-21F4AAACA902}" type="presOf" srcId="{70364DBF-CEA7-4122-A7A8-502E918520A8}" destId="{6B5F133C-D5AF-4771-AD7A-BCACA3EEEE14}" srcOrd="1" destOrd="0" presId="urn:microsoft.com/office/officeart/2009/3/layout/HorizontalOrganizationChart"/>
+    <dgm:cxn modelId="{663BE28A-5DDB-4301-9F36-993154456B5B}" type="presOf" srcId="{6B2C547E-A3E5-4BE3-86D7-AD5DCD637D4F}" destId="{1F5A4257-B7C7-493A-ACD5-0F8E3359C679}" srcOrd="0" destOrd="0" presId="urn:microsoft.com/office/officeart/2009/3/layout/HorizontalOrganizationChart"/>
+    <dgm:cxn modelId="{A578F922-6A02-42F4-AC4C-ADB1B6291D7D}" type="presOf" srcId="{2ABAE041-A01B-4A5B-9214-2363857BDA5C}" destId="{B7A0CAD7-3EBF-476A-B2A2-52EA5F1A00FB}" srcOrd="0" destOrd="0" presId="urn:microsoft.com/office/officeart/2009/3/layout/HorizontalOrganizationChart"/>
+    <dgm:cxn modelId="{F6BB0B51-0FD2-464D-962C-776FE2F3ECFC}" srcId="{7165AC04-7DA8-4AF8-8BAE-CB741D3DE9B9}" destId="{99787B07-3905-42FE-9431-603E6EC4AF44}" srcOrd="0" destOrd="0" parTransId="{83CAD8EA-F457-4ACB-B70D-7A0706565D8F}" sibTransId="{42EB19E1-C454-47EE-AD5C-97A0F14E41E4}"/>
+    <dgm:cxn modelId="{8D110397-0B64-4E87-8B66-A5FD23E53F9D}" type="presOf" srcId="{F5CF903E-9F6D-4B9D-900F-7D5A2A6F5F66}" destId="{816F34C2-79C6-4E98-AE75-19F9557FDE91}" srcOrd="1" destOrd="0" presId="urn:microsoft.com/office/officeart/2009/3/layout/HorizontalOrganizationChart"/>
+    <dgm:cxn modelId="{471F5016-4420-49E7-8BF9-E674665B5927}" srcId="{D6ED44A7-7F6F-46E4-B6F1-57C31B1EA930}" destId="{857DA822-E89F-49E3-9558-BC9A614B7B2E}" srcOrd="0" destOrd="0" parTransId="{3130A0F9-2C80-4888-A0C9-BD7B53FAF9E9}" sibTransId="{3D4C13FA-25EC-40D6-9FAE-18D36E3DFC14}"/>
     <dgm:cxn modelId="{60CC79F0-7900-4D0B-874D-B1DE8E54A3E8}" srcId="{D6ED44A7-7F6F-46E4-B6F1-57C31B1EA930}" destId="{6B91BE19-7F7E-41EE-8F8A-2F1A8D240D4C}" srcOrd="1" destOrd="0" parTransId="{F2903B6D-F87B-43C6-9BDE-2C149D85246D}" sibTransId="{139CC0A6-5B73-493B-A95E-6081F027F65F}"/>
-    <dgm:cxn modelId="{0C9DD8B2-7F84-41A3-8979-158555ABF84A}" type="presOf" srcId="{63C451AF-0DE6-415D-A080-07A4496EE903}" destId="{FF184EA5-E382-4318-94E3-990725729D5A}" srcOrd="0" destOrd="0" presId="urn:microsoft.com/office/officeart/2009/3/layout/HorizontalOrganizationChart"/>
-    <dgm:cxn modelId="{95B1F43F-4FD1-4814-B8B2-6241EBFF0480}" type="presOf" srcId="{0D4A24D3-7319-4036-A144-BE7C0EDF29A9}" destId="{40E38535-02A1-4246-AFFC-70C91A6DD807}" srcOrd="0" destOrd="0" presId="urn:microsoft.com/office/officeart/2009/3/layout/HorizontalOrganizationChart"/>
+    <dgm:cxn modelId="{AB34853E-8915-4B8A-97AE-33D2479B38F6}" srcId="{857DA822-E89F-49E3-9558-BC9A614B7B2E}" destId="{70364DBF-CEA7-4122-A7A8-502E918520A8}" srcOrd="0" destOrd="0" parTransId="{2ABAE041-A01B-4A5B-9214-2363857BDA5C}" sibTransId="{DB2779FE-CE19-4325-918F-E79D1EA3FFFF}"/>
+    <dgm:cxn modelId="{758A87C8-96A1-4D68-BF98-CF00349B2022}" type="presOf" srcId="{DA0E7F61-8CD2-4D62-9A33-D24EFE4EF341}" destId="{7E50A062-7560-4B83-8713-FC30C17C6E8A}" srcOrd="0" destOrd="0" presId="urn:microsoft.com/office/officeart/2009/3/layout/HorizontalOrganizationChart"/>
+    <dgm:cxn modelId="{4937F366-8B5B-4398-9D54-DDC0FD76BAD8}" type="presOf" srcId="{4BE2BFC7-1572-45B6-983B-0818696CEC95}" destId="{85DAB1E2-A342-4FD8-BC4D-33F7FFA329D8}" srcOrd="0" destOrd="0" presId="urn:microsoft.com/office/officeart/2009/3/layout/HorizontalOrganizationChart"/>
+    <dgm:cxn modelId="{B72602A8-1B0E-455E-A14C-F70CF097B033}" type="presOf" srcId="{6FD89FC4-35A8-4F97-A89E-9C325EA4E7A5}" destId="{79D110E6-762C-4016-AC36-C0FF644E0B6E}" srcOrd="0" destOrd="0" presId="urn:microsoft.com/office/officeart/2009/3/layout/HorizontalOrganizationChart"/>
+    <dgm:cxn modelId="{2594DA6B-240E-40C4-AD83-7FCF7E5ECE2C}" type="presOf" srcId="{00DEF4BA-F5A1-4D24-B210-1C39F1B35AE6}" destId="{81D04728-DEA8-43BD-A17E-0BDE47C610D9}" srcOrd="0" destOrd="0" presId="urn:microsoft.com/office/officeart/2009/3/layout/HorizontalOrganizationChart"/>
+    <dgm:cxn modelId="{432AEDFE-CDC3-4C8A-9AF3-5C1E538698AD}" srcId="{D2FDD989-C301-42BB-B394-7246D212EA08}" destId="{D6ED44A7-7F6F-46E4-B6F1-57C31B1EA930}" srcOrd="1" destOrd="0" parTransId="{1DB5C1CB-1C96-4958-88DD-7B123FC2F6B1}" sibTransId="{EE10DE2E-44D5-4061-B1F9-D755A89EF024}"/>
+    <dgm:cxn modelId="{1A604FB8-26FD-44B4-AE06-159F4522E45A}" type="presOf" srcId="{CDBF7332-6205-4D52-B388-9C190B4B867B}" destId="{62D6D41E-BE44-4D82-8C41-4FD00C439433}" srcOrd="0" destOrd="0" presId="urn:microsoft.com/office/officeart/2009/3/layout/HorizontalOrganizationChart"/>
+    <dgm:cxn modelId="{5A8867AF-1A33-47C0-B15D-3739163F0116}" srcId="{875D4011-7CFD-448C-A3CC-4436BCC3F09E}" destId="{FD406D31-5931-4646-8C71-73B4CF38DCC1}" srcOrd="2" destOrd="0" parTransId="{AE155577-13EB-4D2B-AD53-FB46DA52F5DF}" sibTransId="{C8A5E321-C8B3-4350-A9CE-7AF19B615890}"/>
+    <dgm:cxn modelId="{6849CED7-560F-489F-A0EB-70B30BFD9F19}" srcId="{05CE3A32-3FE4-44BC-9178-1254A9E9480D}" destId="{4C4EB091-2B04-44AE-BB38-67DF49C72E65}" srcOrd="0" destOrd="0" parTransId="{0EEBF9AC-5499-49B8-903A-5823A4996BF3}" sibTransId="{8A72E01B-DD10-46A2-BC5E-1CF564FBD4C6}"/>
+    <dgm:cxn modelId="{787F2BC1-01AE-4DFE-8E13-5836D38F6EBC}" srcId="{78CC48EC-45BA-46FE-9542-E311EC77FAAB}" destId="{7165AC04-7DA8-4AF8-8BAE-CB741D3DE9B9}" srcOrd="0" destOrd="0" parTransId="{9B2BBD9A-9C5E-4622-BA14-2C7000782F22}" sibTransId="{F9228C95-3E92-437B-AC0D-847CCE8EF94D}"/>
+    <dgm:cxn modelId="{1764B4FC-D953-44E4-AD08-1B9D4E9F6F9C}" type="presOf" srcId="{D6ED44A7-7F6F-46E4-B6F1-57C31B1EA930}" destId="{C47D9D74-077A-4270-8F54-ADC2F7D319F0}" srcOrd="0" destOrd="0" presId="urn:microsoft.com/office/officeart/2009/3/layout/HorizontalOrganizationChart"/>
+    <dgm:cxn modelId="{54D1EE93-92D6-4064-A14E-4664501DAC8C}" srcId="{F5CF903E-9F6D-4B9D-900F-7D5A2A6F5F66}" destId="{875D4011-7CFD-448C-A3CC-4436BCC3F09E}" srcOrd="0" destOrd="0" parTransId="{E619505B-0727-4AD9-94DD-27734312B4D2}" sibTransId="{073385B5-8382-4636-922B-808D3806A4DF}"/>
+    <dgm:cxn modelId="{42BA638F-735B-4C56-B9B4-32B8712A0CD6}" type="presOf" srcId="{0FF773E1-C96E-4AB1-B9A9-EF4CF8F907A4}" destId="{BF18C4AC-2782-410F-BC95-8DEB6B84928B}" srcOrd="1" destOrd="0" presId="urn:microsoft.com/office/officeart/2009/3/layout/HorizontalOrganizationChart"/>
+    <dgm:cxn modelId="{6DA7497B-B33F-438C-8B9F-965090DD1053}" type="presOf" srcId="{857EF621-5CDD-4F51-A806-B7214BE7377B}" destId="{B7E3D0D5-453B-4C0A-B56B-ACC464179651}" srcOrd="1" destOrd="0" presId="urn:microsoft.com/office/officeart/2009/3/layout/HorizontalOrganizationChart"/>
+    <dgm:cxn modelId="{342A7B9C-9266-4F1B-9288-80C982246F87}" type="presOf" srcId="{F2970618-BA7D-4957-BDE5-4679B2612DD9}" destId="{76E09F1D-45FE-42F3-9E8C-C986076E1C0E}" srcOrd="0" destOrd="0" presId="urn:microsoft.com/office/officeart/2009/3/layout/HorizontalOrganizationChart"/>
+    <dgm:cxn modelId="{17429EA6-8312-4A90-9AFC-6C4EDFEAE587}" type="presOf" srcId="{67FB990C-EB07-4588-AD60-DFDD89551563}" destId="{090B9208-8A4D-4BDC-B088-4930FA3F1E4E}" srcOrd="0" destOrd="0" presId="urn:microsoft.com/office/officeart/2009/3/layout/HorizontalOrganizationChart"/>
+    <dgm:cxn modelId="{8C8CE3E5-1C0D-4F10-AECD-14F8396CA32B}" type="presOf" srcId="{9B2BBD9A-9C5E-4622-BA14-2C7000782F22}" destId="{817BE198-F309-4E7B-A7EC-ABFD687E1FF1}" srcOrd="0" destOrd="0" presId="urn:microsoft.com/office/officeart/2009/3/layout/HorizontalOrganizationChart"/>
     <dgm:cxn modelId="{18F6E144-F560-40B9-9FCA-4CDDD5B4FC1E}" srcId="{A0B61847-E55C-4873-966C-9AA2A02EC1BE}" destId="{C9133969-69AB-43BE-BE31-E2D23F75069B}" srcOrd="0" destOrd="0" parTransId="{E18A83E2-B09C-4433-9767-D861EC35EE4D}" sibTransId="{D944E3EE-402F-489B-A046-BBBA94C159C8}"/>
-    <dgm:cxn modelId="{15F1B07C-8157-4D5C-9F87-2144A1E50961}" type="presOf" srcId="{67FB990C-EB07-4588-AD60-DFDD89551563}" destId="{BBCD3483-D739-49CA-9B89-4CF8A331DF52}" srcOrd="1" destOrd="0" presId="urn:microsoft.com/office/officeart/2009/3/layout/HorizontalOrganizationChart"/>
-    <dgm:cxn modelId="{6A15A473-DA83-4679-B244-CE033B71849C}" type="presOf" srcId="{6B91BE19-7F7E-41EE-8F8A-2F1A8D240D4C}" destId="{0ABED88C-6E89-49FE-B81D-588196E271AF}" srcOrd="0" destOrd="0" presId="urn:microsoft.com/office/officeart/2009/3/layout/HorizontalOrganizationChart"/>
+    <dgm:cxn modelId="{7CFDD892-6570-4A0D-B46B-585A4AC8493F}" type="presOf" srcId="{3130A0F9-2C80-4888-A0C9-BD7B53FAF9E9}" destId="{ED83AA6B-1513-4EE1-BEB4-EC48DFC6F915}" srcOrd="0" destOrd="0" presId="urn:microsoft.com/office/officeart/2009/3/layout/HorizontalOrganizationChart"/>
     <dgm:cxn modelId="{02E0CB10-F25E-4C7A-9E8C-FCDFE427549D}" type="presOf" srcId="{F5CF903E-9F6D-4B9D-900F-7D5A2A6F5F66}" destId="{A3C886A7-6E15-4766-A924-32A7913F0C1C}" srcOrd="0" destOrd="0" presId="urn:microsoft.com/office/officeart/2009/3/layout/HorizontalOrganizationChart"/>
     <dgm:cxn modelId="{AE763945-636E-401B-9D8E-03390071412D}" type="presOf" srcId="{4C4EB091-2B04-44AE-BB38-67DF49C72E65}" destId="{CBEE0467-E0FC-4AF4-A7C8-F696FC2C001C}" srcOrd="1" destOrd="0" presId="urn:microsoft.com/office/officeart/2009/3/layout/HorizontalOrganizationChart"/>
-    <dgm:cxn modelId="{0A3ECA5D-03A6-422A-B964-A6E7DEE8A393}" type="presOf" srcId="{09510EC8-ECC5-4BAF-9CD7-F9BB40FF34B0}" destId="{D43AE39C-CD89-460F-A4BA-01CA5A27EBA2}" srcOrd="0" destOrd="0" presId="urn:microsoft.com/office/officeart/2009/3/layout/HorizontalOrganizationChart"/>
-    <dgm:cxn modelId="{0D2E8580-79F7-4F03-94A2-7C496ECCE9A9}" type="presOf" srcId="{8D73D8C2-DE10-40A8-BDEC-4778DEAA1CA2}" destId="{FBA6D6F7-DEB3-496F-B1B3-EF2B502B70D2}" srcOrd="1" destOrd="0" presId="urn:microsoft.com/office/officeart/2009/3/layout/HorizontalOrganizationChart"/>
-    <dgm:cxn modelId="{86CD3A3B-0BFE-4EEE-9898-E7F56629DA31}" srcId="{875D4011-7CFD-448C-A3CC-4436BCC3F09E}" destId="{2ECD8A08-DF71-40FA-A01B-F586233FBA82}" srcOrd="0" destOrd="0" parTransId="{0D4A24D3-7319-4036-A144-BE7C0EDF29A9}" sibTransId="{AD52978E-DDAF-46D8-80BD-481F1FB0C937}"/>
-    <dgm:cxn modelId="{7CFDD892-6570-4A0D-B46B-585A4AC8493F}" type="presOf" srcId="{3130A0F9-2C80-4888-A0C9-BD7B53FAF9E9}" destId="{ED83AA6B-1513-4EE1-BEB4-EC48DFC6F915}" srcOrd="0" destOrd="0" presId="urn:microsoft.com/office/officeart/2009/3/layout/HorizontalOrganizationChart"/>
-    <dgm:cxn modelId="{8BD9748B-8582-4E97-95AC-8ECB23B017F0}" type="presOf" srcId="{FB4FB845-B5E1-4676-A9C9-FDF074DB573D}" destId="{1C29CDBB-EDE3-4B4F-AF54-49C9BE70E8DA}" srcOrd="0" destOrd="0" presId="urn:microsoft.com/office/officeart/2009/3/layout/HorizontalOrganizationChart"/>
-    <dgm:cxn modelId="{A578F922-6A02-42F4-AC4C-ADB1B6291D7D}" type="presOf" srcId="{2ABAE041-A01B-4A5B-9214-2363857BDA5C}" destId="{B7A0CAD7-3EBF-476A-B2A2-52EA5F1A00FB}" srcOrd="0" destOrd="0" presId="urn:microsoft.com/office/officeart/2009/3/layout/HorizontalOrganizationChart"/>
-    <dgm:cxn modelId="{78B5FC93-7AE0-4407-92F7-E7B6323ABA41}" type="presOf" srcId="{4C4EB091-2B04-44AE-BB38-67DF49C72E65}" destId="{2DAE2D84-5114-4304-828A-93079DF6847A}" srcOrd="0" destOrd="0" presId="urn:microsoft.com/office/officeart/2009/3/layout/HorizontalOrganizationChart"/>
+    <dgm:cxn modelId="{7F1BBB7D-0E1D-4A5E-BF29-6F4B117A1626}" srcId="{F8D70772-4A77-4E16-80CB-DA089D5EFA19}" destId="{A0B61847-E55C-4873-966C-9AA2A02EC1BE}" srcOrd="0" destOrd="0" parTransId="{38968339-7F3A-46F7-A0DF-21D6E4D335F5}" sibTransId="{F4C23E34-EE81-42AD-BCFB-047A250B48E4}"/>
+    <dgm:cxn modelId="{66E770EB-7E4B-41F6-BE9F-E4228A2EBF5C}" type="presOf" srcId="{1CA840A3-55CA-473D-ADFD-D92BBF677443}" destId="{9244B12A-5D28-47B8-AF59-534D0A8FB625}" srcOrd="0" destOrd="0" presId="urn:microsoft.com/office/officeart/2009/3/layout/HorizontalOrganizationChart"/>
+    <dgm:cxn modelId="{A49291AA-8EEA-4B73-B786-BAC426ACE6B1}" type="presOf" srcId="{875D4011-7CFD-448C-A3CC-4436BCC3F09E}" destId="{DE4515EE-6D9A-4F18-8A25-2F8BDD7F4AAE}" srcOrd="1" destOrd="0" presId="urn:microsoft.com/office/officeart/2009/3/layout/HorizontalOrganizationChart"/>
+    <dgm:cxn modelId="{15F1B07C-8157-4D5C-9F87-2144A1E50961}" type="presOf" srcId="{67FB990C-EB07-4588-AD60-DFDD89551563}" destId="{BBCD3483-D739-49CA-9B89-4CF8A331DF52}" srcOrd="1" destOrd="0" presId="urn:microsoft.com/office/officeart/2009/3/layout/HorizontalOrganizationChart"/>
+    <dgm:cxn modelId="{6DED229A-DEA2-47DD-9842-5FBF8AC40B11}" type="presOf" srcId="{F2903B6D-F87B-43C6-9BDE-2C149D85246D}" destId="{54CF2207-67DE-4D65-BB58-DE7100F3A357}" srcOrd="0" destOrd="0" presId="urn:microsoft.com/office/officeart/2009/3/layout/HorizontalOrganizationChart"/>
+    <dgm:cxn modelId="{93F7FACC-F087-4CB4-B0AF-8D529889383E}" type="presOf" srcId="{0EB40DEC-AB4B-423C-817F-A3FA48937BB2}" destId="{27E5387A-3F6D-4E9A-8133-BE50923433EA}" srcOrd="0" destOrd="0" presId="urn:microsoft.com/office/officeart/2009/3/layout/HorizontalOrganizationChart"/>
+    <dgm:cxn modelId="{07CBF243-23EF-47F3-B346-5BFDECC3ECC1}" type="presOf" srcId="{85B172ED-FE47-4C74-9C66-E4B49D3CE5FA}" destId="{C769D7FA-1B45-4DFF-B40F-F9E170469F1D}" srcOrd="0" destOrd="0" presId="urn:microsoft.com/office/officeart/2009/3/layout/HorizontalOrganizationChart"/>
+    <dgm:cxn modelId="{BBB8537E-E0B7-49D0-B5DB-DE12FA455F3B}" type="presOf" srcId="{8C578C9C-B54F-436D-BB12-96FC1AD615C2}" destId="{787AE355-14AF-486A-8568-8A9436A10A8C}" srcOrd="0" destOrd="0" presId="urn:microsoft.com/office/officeart/2009/3/layout/HorizontalOrganizationChart"/>
+    <dgm:cxn modelId="{9F9F90BE-E940-4F4F-9C0E-54055A25255B}" type="presOf" srcId="{1CA840A3-55CA-473D-ADFD-D92BBF677443}" destId="{8AA72F3B-6411-4A2C-9E7F-8595677151CC}" srcOrd="1" destOrd="0" presId="urn:microsoft.com/office/officeart/2009/3/layout/HorizontalOrganizationChart"/>
+    <dgm:cxn modelId="{6783FE2F-3131-49CF-970F-16CBA20183ED}" type="presOf" srcId="{875D4011-7CFD-448C-A3CC-4436BCC3F09E}" destId="{1A0C4A93-4DC1-4D91-B526-4B5F60F3660B}" srcOrd="0" destOrd="0" presId="urn:microsoft.com/office/officeart/2009/3/layout/HorizontalOrganizationChart"/>
+    <dgm:cxn modelId="{12F947BD-8D09-49BA-A278-DB00801697E5}" type="presOf" srcId="{488F7D39-E327-4B3F-89C4-E40489C3D624}" destId="{4675F9A0-AEEE-48FC-9F7D-3F2A36738B5B}" srcOrd="0" destOrd="0" presId="urn:microsoft.com/office/officeart/2009/3/layout/HorizontalOrganizationChart"/>
+    <dgm:cxn modelId="{6FDD153C-8A04-41F3-BDA7-E3299D96DE8B}" type="presOf" srcId="{D6ED44A7-7F6F-46E4-B6F1-57C31B1EA930}" destId="{DB249DE6-A341-43A7-8102-18636D0821C8}" srcOrd="1" destOrd="0" presId="urn:microsoft.com/office/officeart/2009/3/layout/HorizontalOrganizationChart"/>
+    <dgm:cxn modelId="{9802267D-B885-4127-9ACD-619BA0C212A1}" srcId="{F5CF903E-9F6D-4B9D-900F-7D5A2A6F5F66}" destId="{4BE2BFC7-1572-45B6-983B-0818696CEC95}" srcOrd="2" destOrd="0" parTransId="{E099E485-8033-4922-9849-AD5E12FD1FFE}" sibTransId="{6AB5D3C3-68F3-4C0A-835C-4C122968EFD1}"/>
+    <dgm:cxn modelId="{D69A82F1-391A-4D46-8424-573F5353C22F}" type="presOf" srcId="{0EEBF9AC-5499-49B8-903A-5823A4996BF3}" destId="{7C83E30D-9881-4523-B374-69C08DB80BA9}" srcOrd="0" destOrd="0" presId="urn:microsoft.com/office/officeart/2009/3/layout/HorizontalOrganizationChart"/>
     <dgm:cxn modelId="{6572DB5E-C644-4C96-85E1-16EDCD2AF120}" type="presOf" srcId="{857DA822-E89F-49E3-9558-BC9A614B7B2E}" destId="{336ED820-1A37-4A32-981B-8C4943BF3B06}" srcOrd="0" destOrd="0" presId="urn:microsoft.com/office/officeart/2009/3/layout/HorizontalOrganizationChart"/>
-    <dgm:cxn modelId="{07CBF243-23EF-47F3-B346-5BFDECC3ECC1}" type="presOf" srcId="{85B172ED-FE47-4C74-9C66-E4B49D3CE5FA}" destId="{C769D7FA-1B45-4DFF-B40F-F9E170469F1D}" srcOrd="0" destOrd="0" presId="urn:microsoft.com/office/officeart/2009/3/layout/HorizontalOrganizationChart"/>
-    <dgm:cxn modelId="{1CBF92F1-E5CB-4D3C-B802-C0AB3B6F900D}" type="presOf" srcId="{46D4813D-F9B3-4F97-B23C-21E011030F41}" destId="{6C2EF6F4-C505-4353-AD5E-0C36EB1A1F9C}" srcOrd="0" destOrd="0" presId="urn:microsoft.com/office/officeart/2009/3/layout/HorizontalOrganizationChart"/>
-    <dgm:cxn modelId="{432AEDFE-CDC3-4C8A-9AF3-5C1E538698AD}" srcId="{D2FDD989-C301-42BB-B394-7246D212EA08}" destId="{D6ED44A7-7F6F-46E4-B6F1-57C31B1EA930}" srcOrd="1" destOrd="0" parTransId="{1DB5C1CB-1C96-4958-88DD-7B123FC2F6B1}" sibTransId="{EE10DE2E-44D5-4061-B1F9-D755A89EF024}"/>
-    <dgm:cxn modelId="{771D101C-D5F5-4422-8DF0-DAFFFE3931AE}" type="presOf" srcId="{81E6A6A1-9CDF-404E-BF9F-958F8899BF8E}" destId="{D580F8B9-D289-42B2-BECF-6B0A256C4CFC}" srcOrd="0" destOrd="0" presId="urn:microsoft.com/office/officeart/2009/3/layout/HorizontalOrganizationChart"/>
-    <dgm:cxn modelId="{F598C19F-A233-410E-8039-6909025D9C39}" srcId="{D2FDD989-C301-42BB-B394-7246D212EA08}" destId="{09510EC8-ECC5-4BAF-9CD7-F9BB40FF34B0}" srcOrd="0" destOrd="0" parTransId="{B0403523-48E6-4DE7-8C1E-667F1ACE87EC}" sibTransId="{94C51012-1DE1-4029-9CA8-288706995E0F}"/>
     <dgm:cxn modelId="{254F89A8-9E1D-4908-8986-8237DEF0580D}" type="presOf" srcId="{9A4C57C1-58E0-4187-97BA-FCFEB182559D}" destId="{13AB14B9-2B86-413C-8ABB-D525D5C9091B}" srcOrd="0" destOrd="0" presId="urn:microsoft.com/office/officeart/2009/3/layout/HorizontalOrganizationChart"/>
-    <dgm:cxn modelId="{8C8CE3E5-1C0D-4F10-AECD-14F8396CA32B}" type="presOf" srcId="{9B2BBD9A-9C5E-4622-BA14-2C7000782F22}" destId="{817BE198-F309-4E7B-A7EC-ABFD687E1FF1}" srcOrd="0" destOrd="0" presId="urn:microsoft.com/office/officeart/2009/3/layout/HorizontalOrganizationChart"/>
-    <dgm:cxn modelId="{9A8FA642-CDE7-470B-ABF4-BC672FE5B144}" type="presOf" srcId="{78CC48EC-45BA-46FE-9542-E311EC77FAAB}" destId="{49E879AF-E004-46F6-80DA-D3252100B65C}" srcOrd="1" destOrd="0" presId="urn:microsoft.com/office/officeart/2009/3/layout/HorizontalOrganizationChart"/>
-    <dgm:cxn modelId="{F6BB0B51-0FD2-464D-962C-776FE2F3ECFC}" srcId="{7165AC04-7DA8-4AF8-8BAE-CB741D3DE9B9}" destId="{99787B07-3905-42FE-9431-603E6EC4AF44}" srcOrd="0" destOrd="0" parTransId="{83CAD8EA-F457-4ACB-B70D-7A0706565D8F}" sibTransId="{42EB19E1-C454-47EE-AD5C-97A0F14E41E4}"/>
-    <dgm:cxn modelId="{B8577C21-D52D-4E35-8EFF-D8B5568757EF}" type="presOf" srcId="{F8D70772-4A77-4E16-80CB-DA089D5EFA19}" destId="{F0AEE5F4-186A-4EA5-9B88-8B7EC4C6D1CE}" srcOrd="1" destOrd="0" presId="urn:microsoft.com/office/officeart/2009/3/layout/HorizontalOrganizationChart"/>
-    <dgm:cxn modelId="{5ECCDF9D-CBDB-4154-9086-5933F5E870C6}" srcId="{70364DBF-CEA7-4122-A7A8-502E918520A8}" destId="{DA0E7F61-8CD2-4D62-9A33-D24EFE4EF341}" srcOrd="0" destOrd="0" parTransId="{9A4C57C1-58E0-4187-97BA-FCFEB182559D}" sibTransId="{350CF987-825C-4687-A4DA-ED6E85296510}"/>
-    <dgm:cxn modelId="{0EC40B32-2B49-4FE8-8DDE-86F9AF5E098E}" type="presOf" srcId="{9E08F495-C4AE-4F28-A386-0A8DEFC6BBBD}" destId="{4BFFA2CA-E21D-4504-B491-1C36FBB2731E}" srcOrd="0" destOrd="0" presId="urn:microsoft.com/office/officeart/2009/3/layout/HorizontalOrganizationChart"/>
-    <dgm:cxn modelId="{5909351D-4CE3-4CE3-B459-EE8AB92CE13C}" type="presOf" srcId="{E18A83E2-B09C-4433-9767-D861EC35EE4D}" destId="{CBBDDF41-DFC8-4D90-8AC3-6F81F1CED4F8}" srcOrd="0" destOrd="0" presId="urn:microsoft.com/office/officeart/2009/3/layout/HorizontalOrganizationChart"/>
-    <dgm:cxn modelId="{D049A663-E2DE-48E4-9770-3B1FDC92E234}" type="presOf" srcId="{0FF773E1-C96E-4AB1-B9A9-EF4CF8F907A4}" destId="{716A296B-9DCB-4EFD-8F08-DB74E8215D67}" srcOrd="0" destOrd="0" presId="urn:microsoft.com/office/officeart/2009/3/layout/HorizontalOrganizationChart"/>
-    <dgm:cxn modelId="{6FD1A898-6297-4DF3-8754-CC5E9E56EE9D}" type="presOf" srcId="{83CAD8EA-F457-4ACB-B70D-7A0706565D8F}" destId="{52BF0315-0702-4273-8372-E39BDD09B0D8}" srcOrd="0" destOrd="0" presId="urn:microsoft.com/office/officeart/2009/3/layout/HorizontalOrganizationChart"/>
-    <dgm:cxn modelId="{21D2B346-07C7-45E0-BAE4-921735753E49}" type="presOf" srcId="{C09133D0-FEE3-4845-BA79-F04FA509353C}" destId="{C21D1D00-37C7-497C-B84D-C843E4458E0F}" srcOrd="1" destOrd="0" presId="urn:microsoft.com/office/officeart/2009/3/layout/HorizontalOrganizationChart"/>
-    <dgm:cxn modelId="{6DA7497B-B33F-438C-8B9F-965090DD1053}" type="presOf" srcId="{857EF621-5CDD-4F51-A806-B7214BE7377B}" destId="{B7E3D0D5-453B-4C0A-B56B-ACC464179651}" srcOrd="1" destOrd="0" presId="urn:microsoft.com/office/officeart/2009/3/layout/HorizontalOrganizationChart"/>
-    <dgm:cxn modelId="{40483720-EA5E-4185-B30C-CAE371DBE588}" type="presOf" srcId="{41A7C6A1-347E-4A4E-A3F1-9B2E9FF60B80}" destId="{F979E834-769E-40DA-B841-1A84B33AAEB6}" srcOrd="0" destOrd="0" presId="urn:microsoft.com/office/officeart/2009/3/layout/HorizontalOrganizationChart"/>
-    <dgm:cxn modelId="{B958F64C-8BE7-457E-8F22-21DB67477B82}" type="presOf" srcId="{78CC48EC-45BA-46FE-9542-E311EC77FAAB}" destId="{2D4F4555-AEB8-4812-B592-37BE3AF93618}" srcOrd="0" destOrd="0" presId="urn:microsoft.com/office/officeart/2009/3/layout/HorizontalOrganizationChart"/>
-    <dgm:cxn modelId="{A9B097F5-1C82-4788-811A-7EF68FC7E2EB}" type="presOf" srcId="{FD406D31-5931-4646-8C71-73B4CF38DCC1}" destId="{AA9C057E-CBC1-421A-B365-30A870B00142}" srcOrd="0" destOrd="0" presId="urn:microsoft.com/office/officeart/2009/3/layout/HorizontalOrganizationChart"/>
-    <dgm:cxn modelId="{54D1EE93-92D6-4064-A14E-4664501DAC8C}" srcId="{F5CF903E-9F6D-4B9D-900F-7D5A2A6F5F66}" destId="{875D4011-7CFD-448C-A3CC-4436BCC3F09E}" srcOrd="0" destOrd="0" parTransId="{E619505B-0727-4AD9-94DD-27734312B4D2}" sibTransId="{073385B5-8382-4636-922B-808D3806A4DF}"/>
-    <dgm:cxn modelId="{24D3B070-9D7B-40F6-97D2-0330B35A42E0}" type="presOf" srcId="{084F17B5-BA5A-4476-A651-84E34BBCBFA9}" destId="{47B74644-DD88-47F6-860E-854D8D841CBA}" srcOrd="0" destOrd="0" presId="urn:microsoft.com/office/officeart/2009/3/layout/HorizontalOrganizationChart"/>
-    <dgm:cxn modelId="{BFAD1E37-4448-46C0-A2A3-5CEE64E06C6A}" srcId="{41A7C6A1-347E-4A4E-A3F1-9B2E9FF60B80}" destId="{8D73D8C2-DE10-40A8-BDEC-4778DEAA1CA2}" srcOrd="0" destOrd="0" parTransId="{CDBF7332-6205-4D52-B388-9C190B4B867B}" sibTransId="{F9B78F6C-F481-42C1-A40E-9C5DAC1994EE}"/>
-    <dgm:cxn modelId="{2DD5758D-058E-4CC0-B9CC-B3F25B141488}" srcId="{F5CF903E-9F6D-4B9D-900F-7D5A2A6F5F66}" destId="{5CCA39A5-AA43-421B-A4AC-6D3F5F939833}" srcOrd="1" destOrd="0" parTransId="{6FD89FC4-35A8-4F97-A89E-9C325EA4E7A5}" sibTransId="{12459432-963E-4F50-B830-C2001FDC7B41}"/>
-    <dgm:cxn modelId="{AB34853E-8915-4B8A-97AE-33D2479B38F6}" srcId="{857DA822-E89F-49E3-9558-BC9A614B7B2E}" destId="{70364DBF-CEA7-4122-A7A8-502E918520A8}" srcOrd="0" destOrd="0" parTransId="{2ABAE041-A01B-4A5B-9214-2363857BDA5C}" sibTransId="{DB2779FE-CE19-4325-918F-E79D1EA3FFFF}"/>
-    <dgm:cxn modelId="{2594DA6B-240E-40C4-AD83-7FCF7E5ECE2C}" type="presOf" srcId="{00DEF4BA-F5A1-4D24-B210-1C39F1B35AE6}" destId="{81D04728-DEA8-43BD-A17E-0BDE47C610D9}" srcOrd="0" destOrd="0" presId="urn:microsoft.com/office/officeart/2009/3/layout/HorizontalOrganizationChart"/>
-    <dgm:cxn modelId="{8BF3E28C-DDAD-46A9-B816-CE12FC238439}" type="presOf" srcId="{C09133D0-FEE3-4845-BA79-F04FA509353C}" destId="{02C78742-6371-4A6C-970E-C8BFA6811453}" srcOrd="0" destOrd="0" presId="urn:microsoft.com/office/officeart/2009/3/layout/HorizontalOrganizationChart"/>
-    <dgm:cxn modelId="{0572CAA6-8CD0-421A-AC07-72DB93E7BC9A}" type="presOf" srcId="{99787B07-3905-42FE-9431-603E6EC4AF44}" destId="{D4B78E75-2789-43F4-9EF0-B0B7AD3BE78D}" srcOrd="0" destOrd="0" presId="urn:microsoft.com/office/officeart/2009/3/layout/HorizontalOrganizationChart"/>
-    <dgm:cxn modelId="{776E581E-6409-43A4-9082-BBCC00B9D596}" type="presOf" srcId="{1F2D2D5A-A4D6-4B03-9170-1F846637717A}" destId="{21DC71C5-6535-4859-9380-E1ADC98C0E53}" srcOrd="0" destOrd="0" presId="urn:microsoft.com/office/officeart/2009/3/layout/HorizontalOrganizationChart"/>
-    <dgm:cxn modelId="{6FDD153C-8A04-41F3-BDA7-E3299D96DE8B}" type="presOf" srcId="{D6ED44A7-7F6F-46E4-B6F1-57C31B1EA930}" destId="{DB249DE6-A341-43A7-8102-18636D0821C8}" srcOrd="1" destOrd="0" presId="urn:microsoft.com/office/officeart/2009/3/layout/HorizontalOrganizationChart"/>
-    <dgm:cxn modelId="{E6252A8D-EDB6-4F8F-AD57-AED7AF17281A}" srcId="{6B91BE19-7F7E-41EE-8F8A-2F1A8D240D4C}" destId="{ED3AECD0-84CA-485F-A652-BAFD791EA92C}" srcOrd="0" destOrd="0" parTransId="{46D4813D-F9B3-4F97-B23C-21E011030F41}" sibTransId="{A183C564-5415-46CA-B335-A94751411487}"/>
-    <dgm:cxn modelId="{55039C6F-A073-4172-89FB-7782AB668B9E}" type="presOf" srcId="{D2FDD989-C301-42BB-B394-7246D212EA08}" destId="{8CFE662F-F699-4FA0-93BA-75BAC7617AD2}" srcOrd="0" destOrd="0" presId="urn:microsoft.com/office/officeart/2009/3/layout/HorizontalOrganizationChart"/>
-    <dgm:cxn modelId="{663BE28A-5DDB-4301-9F36-993154456B5B}" type="presOf" srcId="{6B2C547E-A3E5-4BE3-86D7-AD5DCD637D4F}" destId="{1F5A4257-B7C7-493A-ACD5-0F8E3359C679}" srcOrd="0" destOrd="0" presId="urn:microsoft.com/office/officeart/2009/3/layout/HorizontalOrganizationChart"/>
-    <dgm:cxn modelId="{CA7B993F-1C2C-4FAF-B41D-FBFA85C32EEF}" srcId="{88EFA125-05CC-43FF-9382-13FC646F67B2}" destId="{85B172ED-FE47-4C74-9C66-E4B49D3CE5FA}" srcOrd="0" destOrd="0" parTransId="{6B2C547E-A3E5-4BE3-86D7-AD5DCD637D4F}" sibTransId="{35891FFD-57D8-4071-A612-FCE0DD2E0F34}"/>
-    <dgm:cxn modelId="{D67941B2-99D4-4F9A-BA7F-3FBA617FF199}" type="presOf" srcId="{6564ABAF-575A-44BE-9CC6-92EB36279CEE}" destId="{A31EE17D-D7AD-4F4B-AB05-3523EB0B6328}" srcOrd="0" destOrd="0" presId="urn:microsoft.com/office/officeart/2009/3/layout/HorizontalOrganizationChart"/>
-    <dgm:cxn modelId="{A0BE8432-2AF6-4B1E-A63D-10B7CD137587}" type="presOf" srcId="{8ECA2497-3DC6-4A44-8884-CA5E84A50CD2}" destId="{915EBF13-E9E0-4011-A880-DB1226B58929}" srcOrd="1" destOrd="0" presId="urn:microsoft.com/office/officeart/2009/3/layout/HorizontalOrganizationChart"/>
-    <dgm:cxn modelId="{7A15DA9D-2280-453D-8885-5E3880DB19FE}" srcId="{F5CF903E-9F6D-4B9D-900F-7D5A2A6F5F66}" destId="{1CA840A3-55CA-473D-ADFD-D92BBF677443}" srcOrd="3" destOrd="0" parTransId="{1F2D2D5A-A4D6-4B03-9170-1F846637717A}" sibTransId="{87F18AA1-9EA8-4E4E-8A3A-F2D97C95245B}"/>
-    <dgm:cxn modelId="{7F1BBB7D-0E1D-4A5E-BF29-6F4B117A1626}" srcId="{F8D70772-4A77-4E16-80CB-DA089D5EFA19}" destId="{A0B61847-E55C-4873-966C-9AA2A02EC1BE}" srcOrd="0" destOrd="0" parTransId="{38968339-7F3A-46F7-A0DF-21D6E4D335F5}" sibTransId="{F4C23E34-EE81-42AD-BCFB-047A250B48E4}"/>
-    <dgm:cxn modelId="{9F9F90BE-E940-4F4F-9C0E-54055A25255B}" type="presOf" srcId="{1CA840A3-55CA-473D-ADFD-D92BBF677443}" destId="{8AA72F3B-6411-4A2C-9E7F-8595677151CC}" srcOrd="1" destOrd="0" presId="urn:microsoft.com/office/officeart/2009/3/layout/HorizontalOrganizationChart"/>
-    <dgm:cxn modelId="{F41CCE5A-1DFC-4826-A357-98CE8A40F5AD}" type="presOf" srcId="{ED3AECD0-84CA-485F-A652-BAFD791EA92C}" destId="{532FAAFB-C773-4E28-8E51-ED5CAD7939FF}" srcOrd="1" destOrd="0" presId="urn:microsoft.com/office/officeart/2009/3/layout/HorizontalOrganizationChart"/>
-    <dgm:cxn modelId="{34E1735A-9BDA-43DB-B88A-968F22254BFE}" type="presOf" srcId="{7165AC04-7DA8-4AF8-8BAE-CB741D3DE9B9}" destId="{7F0979D7-C0EB-41EC-9295-45B2ADB9FEFC}" srcOrd="1" destOrd="0" presId="urn:microsoft.com/office/officeart/2009/3/layout/HorizontalOrganizationChart"/>
-    <dgm:cxn modelId="{C6694A2F-C9D3-4B2B-9BB5-212C95F1B9B1}" type="presOf" srcId="{F2970618-BA7D-4957-BDE5-4679B2612DD9}" destId="{55A64C7D-2814-4720-A5C2-AFC77883D643}" srcOrd="1" destOrd="0" presId="urn:microsoft.com/office/officeart/2009/3/layout/HorizontalOrganizationChart"/>
-    <dgm:cxn modelId="{87182C79-B855-41D7-8C0C-7DF4858FC396}" type="presOf" srcId="{5C76DD75-D8BF-4C6E-8ED8-E77FD6A240DB}" destId="{5A8C21F3-F6F4-4DF1-A699-E06FD7641312}" srcOrd="0" destOrd="0" presId="urn:microsoft.com/office/officeart/2009/3/layout/HorizontalOrganizationChart"/>
-    <dgm:cxn modelId="{5A8867AF-1A33-47C0-B15D-3739163F0116}" srcId="{875D4011-7CFD-448C-A3CC-4436BCC3F09E}" destId="{FD406D31-5931-4646-8C71-73B4CF38DCC1}" srcOrd="2" destOrd="0" parTransId="{AE155577-13EB-4D2B-AD53-FB46DA52F5DF}" sibTransId="{C8A5E321-C8B3-4350-A9CE-7AF19B615890}"/>
-    <dgm:cxn modelId="{58352E97-24B3-425C-AFB0-6B918415ED24}" type="presOf" srcId="{41A7C6A1-347E-4A4E-A3F1-9B2E9FF60B80}" destId="{BA82972F-9D04-460C-8288-A84780A3B71B}" srcOrd="1" destOrd="0" presId="urn:microsoft.com/office/officeart/2009/3/layout/HorizontalOrganizationChart"/>
-    <dgm:cxn modelId="{0705355B-5A08-453B-B0B1-BEA09EB6F738}" type="presOf" srcId="{09510EC8-ECC5-4BAF-9CD7-F9BB40FF34B0}" destId="{25BCE98E-3317-426C-A272-FDB9F5F357D8}" srcOrd="1" destOrd="0" presId="urn:microsoft.com/office/officeart/2009/3/layout/HorizontalOrganizationChart"/>
-    <dgm:cxn modelId="{758A87C8-96A1-4D68-BF98-CF00349B2022}" type="presOf" srcId="{DA0E7F61-8CD2-4D62-9A33-D24EFE4EF341}" destId="{7E50A062-7560-4B83-8713-FC30C17C6E8A}" srcOrd="0" destOrd="0" presId="urn:microsoft.com/office/officeart/2009/3/layout/HorizontalOrganizationChart"/>
-    <dgm:cxn modelId="{8C1B2F56-D24C-4767-92E0-EF8C54659217}" type="presOf" srcId="{E099E485-8033-4922-9849-AD5E12FD1FFE}" destId="{81757558-ECB3-484A-B2D0-4AFACC3C5964}" srcOrd="0" destOrd="0" presId="urn:microsoft.com/office/officeart/2009/3/layout/HorizontalOrganizationChart"/>
-    <dgm:cxn modelId="{2773BBE6-651A-41F2-8FF5-3867CA667280}" srcId="{857DA822-E89F-49E3-9558-BC9A614B7B2E}" destId="{F8D70772-4A77-4E16-80CB-DA089D5EFA19}" srcOrd="2" destOrd="0" parTransId="{5C76DD75-D8BF-4C6E-8ED8-E77FD6A240DB}" sibTransId="{AF6365C0-5671-401C-BC2B-575E9EE10992}"/>
-    <dgm:cxn modelId="{D4CFA32D-293A-4107-BFC3-0F24E20AF9E6}" type="presOf" srcId="{C0CD9D81-9BCB-491F-BE0D-6994DEAFDDD4}" destId="{5DA9537E-9698-46A9-BDE0-4D03963D68AC}" srcOrd="0" destOrd="0" presId="urn:microsoft.com/office/officeart/2009/3/layout/HorizontalOrganizationChart"/>
-    <dgm:cxn modelId="{37282E2C-DCA9-4B2B-8076-8884EBD9FB2E}" type="presOf" srcId="{C9133969-69AB-43BE-BE31-E2D23F75069B}" destId="{1A3C7E37-2B37-4ED8-947E-C13ADF38B1BE}" srcOrd="0" destOrd="0" presId="urn:microsoft.com/office/officeart/2009/3/layout/HorizontalOrganizationChart"/>
-    <dgm:cxn modelId="{EBC48C2B-774C-49EF-B6B4-961BEE2601D2}" type="presOf" srcId="{88EFA125-05CC-43FF-9382-13FC646F67B2}" destId="{D46D03D3-2F03-40DD-B31E-9B301050E315}" srcOrd="1" destOrd="0" presId="urn:microsoft.com/office/officeart/2009/3/layout/HorizontalOrganizationChart"/>
-    <dgm:cxn modelId="{8D110397-0B64-4E87-8B66-A5FD23E53F9D}" type="presOf" srcId="{F5CF903E-9F6D-4B9D-900F-7D5A2A6F5F66}" destId="{816F34C2-79C6-4E98-AE75-19F9557FDE91}" srcOrd="1" destOrd="0" presId="urn:microsoft.com/office/officeart/2009/3/layout/HorizontalOrganizationChart"/>
-    <dgm:cxn modelId="{787F2BC1-01AE-4DFE-8E13-5836D38F6EBC}" srcId="{78CC48EC-45BA-46FE-9542-E311EC77FAAB}" destId="{7165AC04-7DA8-4AF8-8BAE-CB741D3DE9B9}" srcOrd="0" destOrd="0" parTransId="{9B2BBD9A-9C5E-4622-BA14-2C7000782F22}" sibTransId="{F9228C95-3E92-437B-AC0D-847CCE8EF94D}"/>
-    <dgm:cxn modelId="{B1381AE2-821F-40B4-B5AC-103434228600}" type="presOf" srcId="{85B172ED-FE47-4C74-9C66-E4B49D3CE5FA}" destId="{21CF30C1-DF3B-42C2-81A8-3E38FFBF85D5}" srcOrd="1" destOrd="0" presId="urn:microsoft.com/office/officeart/2009/3/layout/HorizontalOrganizationChart"/>
-    <dgm:cxn modelId="{12F947BD-8D09-49BA-A278-DB00801697E5}" type="presOf" srcId="{488F7D39-E327-4B3F-89C4-E40489C3D624}" destId="{4675F9A0-AEEE-48FC-9F7D-3F2A36738B5B}" srcOrd="0" destOrd="0" presId="urn:microsoft.com/office/officeart/2009/3/layout/HorizontalOrganizationChart"/>
-    <dgm:cxn modelId="{37C14AE7-AFE3-45E8-AA6E-AE19EE38716C}" type="presOf" srcId="{5A7580D2-0209-4D98-B1A6-14A092E99EBB}" destId="{98939E40-40D1-46E9-B543-DE720A796892}" srcOrd="0" destOrd="0" presId="urn:microsoft.com/office/officeart/2009/3/layout/HorizontalOrganizationChart"/>
-    <dgm:cxn modelId="{17429EA6-8312-4A90-9AFC-6C4EDFEAE587}" type="presOf" srcId="{67FB990C-EB07-4588-AD60-DFDD89551563}" destId="{090B9208-8A4D-4BDC-B088-4930FA3F1E4E}" srcOrd="0" destOrd="0" presId="urn:microsoft.com/office/officeart/2009/3/layout/HorizontalOrganizationChart"/>
-    <dgm:cxn modelId="{2A7D23F8-2660-431A-A0EF-F3EE04E23F49}" type="presOf" srcId="{99787B07-3905-42FE-9431-603E6EC4AF44}" destId="{F436D08A-73FA-4DFD-9773-81C476C08EA9}" srcOrd="1" destOrd="0" presId="urn:microsoft.com/office/officeart/2009/3/layout/HorizontalOrganizationChart"/>
-    <dgm:cxn modelId="{6849CED7-560F-489F-A0EB-70B30BFD9F19}" srcId="{05CE3A32-3FE4-44BC-9178-1254A9E9480D}" destId="{4C4EB091-2B04-44AE-BB38-67DF49C72E65}" srcOrd="0" destOrd="0" parTransId="{0EEBF9AC-5499-49B8-903A-5823A4996BF3}" sibTransId="{8A72E01B-DD10-46A2-BC5E-1CF564FBD4C6}"/>
-    <dgm:cxn modelId="{9872F35A-B620-4C0B-B096-60F77ED0497F}" srcId="{857DA822-E89F-49E3-9558-BC9A614B7B2E}" destId="{F5CF903E-9F6D-4B9D-900F-7D5A2A6F5F66}" srcOrd="4" destOrd="0" parTransId="{8C578C9C-B54F-436D-BB12-96FC1AD615C2}" sibTransId="{80799540-5483-4DFC-AFDA-D9BE18B12E88}"/>
-    <dgm:cxn modelId="{6783FE2F-3131-49CF-970F-16CBA20183ED}" type="presOf" srcId="{875D4011-7CFD-448C-A3CC-4436BCC3F09E}" destId="{1A0C4A93-4DC1-4D91-B526-4B5F60F3660B}" srcOrd="0" destOrd="0" presId="urn:microsoft.com/office/officeart/2009/3/layout/HorizontalOrganizationChart"/>
-    <dgm:cxn modelId="{B72602A8-1B0E-455E-A14C-F70CF097B033}" type="presOf" srcId="{6FD89FC4-35A8-4F97-A89E-9C325EA4E7A5}" destId="{79D110E6-762C-4016-AC36-C0FF644E0B6E}" srcOrd="0" destOrd="0" presId="urn:microsoft.com/office/officeart/2009/3/layout/HorizontalOrganizationChart"/>
-    <dgm:cxn modelId="{903D939F-8CD7-4729-86AF-E4CE53E6E81C}" type="presOf" srcId="{ED3AECD0-84CA-485F-A652-BAFD791EA92C}" destId="{783755FC-7346-4329-A605-70D2EB09645F}" srcOrd="0" destOrd="0" presId="urn:microsoft.com/office/officeart/2009/3/layout/HorizontalOrganizationChart"/>
-    <dgm:cxn modelId="{D8A452D1-1BB8-4734-80DD-10A442A7393F}" type="presOf" srcId="{05CE3A32-3FE4-44BC-9178-1254A9E9480D}" destId="{92350E8A-A643-42D5-9553-30F1554A29E8}" srcOrd="1" destOrd="0" presId="urn:microsoft.com/office/officeart/2009/3/layout/HorizontalOrganizationChart"/>
-    <dgm:cxn modelId="{C91080C0-3526-4569-99C8-FAD8B7D89C91}" type="presOf" srcId="{857DA822-E89F-49E3-9558-BC9A614B7B2E}" destId="{97A3608D-ECAF-4DA5-8FB3-865360520BFE}" srcOrd="1" destOrd="0" presId="urn:microsoft.com/office/officeart/2009/3/layout/HorizontalOrganizationChart"/>
-    <dgm:cxn modelId="{FFABEF9A-777B-4811-A989-DB29EE507CC6}" type="presOf" srcId="{A0B61847-E55C-4873-966C-9AA2A02EC1BE}" destId="{478518D4-7049-40F5-8308-260C6C349B43}" srcOrd="0" destOrd="0" presId="urn:microsoft.com/office/officeart/2009/3/layout/HorizontalOrganizationChart"/>
-    <dgm:cxn modelId="{D69A82F1-391A-4D46-8424-573F5353C22F}" type="presOf" srcId="{0EEBF9AC-5499-49B8-903A-5823A4996BF3}" destId="{7C83E30D-9881-4523-B374-69C08DB80BA9}" srcOrd="0" destOrd="0" presId="urn:microsoft.com/office/officeart/2009/3/layout/HorizontalOrganizationChart"/>
-    <dgm:cxn modelId="{EAE10DDA-DBC7-4DC2-9545-8E42FEB5AB6B}" type="presOf" srcId="{6B91BE19-7F7E-41EE-8F8A-2F1A8D240D4C}" destId="{DD1A71F8-D933-4FFC-ACA6-6A3E648602E9}" srcOrd="1" destOrd="0" presId="urn:microsoft.com/office/officeart/2009/3/layout/HorizontalOrganizationChart"/>
-    <dgm:cxn modelId="{342A7B9C-9266-4F1B-9288-80C982246F87}" type="presOf" srcId="{F2970618-BA7D-4957-BDE5-4679B2612DD9}" destId="{76E09F1D-45FE-42F3-9E8C-C986076E1C0E}" srcOrd="0" destOrd="0" presId="urn:microsoft.com/office/officeart/2009/3/layout/HorizontalOrganizationChart"/>
-    <dgm:cxn modelId="{A49291AA-8EEA-4B73-B786-BAC426ACE6B1}" type="presOf" srcId="{875D4011-7CFD-448C-A3CC-4436BCC3F09E}" destId="{DE4515EE-6D9A-4F18-8A25-2F8BDD7F4AAE}" srcOrd="1" destOrd="0" presId="urn:microsoft.com/office/officeart/2009/3/layout/HorizontalOrganizationChart"/>
-    <dgm:cxn modelId="{A2CF1A33-9E1C-4B2B-9C78-D9342E6315D9}" type="presOf" srcId="{2ECD8A08-DF71-40FA-A01B-F586233FBA82}" destId="{D64E57E3-756D-4B66-9928-DCC8934D02D7}" srcOrd="0" destOrd="0" presId="urn:microsoft.com/office/officeart/2009/3/layout/HorizontalOrganizationChart"/>
-    <dgm:cxn modelId="{4937F366-8B5B-4398-9D54-DDC0FD76BAD8}" type="presOf" srcId="{4BE2BFC7-1572-45B6-983B-0818696CEC95}" destId="{85DAB1E2-A342-4FD8-BC4D-33F7FFA329D8}" srcOrd="0" destOrd="0" presId="urn:microsoft.com/office/officeart/2009/3/layout/HorizontalOrganizationChart"/>
-    <dgm:cxn modelId="{601D2EA7-2E80-41B6-AF46-045D21CEE9E4}" srcId="{A0B61847-E55C-4873-966C-9AA2A02EC1BE}" destId="{41A7C6A1-347E-4A4E-A3F1-9B2E9FF60B80}" srcOrd="1" destOrd="0" parTransId="{00DEF4BA-F5A1-4D24-B210-1C39F1B35AE6}" sibTransId="{BD0AC525-A11F-4438-9557-F4F1B7C75C3E}"/>
-    <dgm:cxn modelId="{6F0946B9-B66E-4B3E-9CB7-39869152996F}" srcId="{F8D70772-4A77-4E16-80CB-DA089D5EFA19}" destId="{857EF621-5CDD-4F51-A806-B7214BE7377B}" srcOrd="3" destOrd="0" parTransId="{6564ABAF-575A-44BE-9CC6-92EB36279CEE}" sibTransId="{E6C2CA4D-FFA8-446B-B309-B8AFF378B57E}"/>
-    <dgm:cxn modelId="{90599AB1-2CF7-480C-B95A-70B5F95B0E90}" type="presOf" srcId="{C9133969-69AB-43BE-BE31-E2D23F75069B}" destId="{1C7E8899-9442-47C0-ADE5-3606ED0FBA6E}" srcOrd="1" destOrd="0" presId="urn:microsoft.com/office/officeart/2009/3/layout/HorizontalOrganizationChart"/>
-    <dgm:cxn modelId="{3829B7CE-5ED8-486B-A6E4-21F4AAACA902}" type="presOf" srcId="{70364DBF-CEA7-4122-A7A8-502E918520A8}" destId="{6B5F133C-D5AF-4771-AD7A-BCACA3EEEE14}" srcOrd="1" destOrd="0" presId="urn:microsoft.com/office/officeart/2009/3/layout/HorizontalOrganizationChart"/>
-    <dgm:cxn modelId="{42BA638F-735B-4C56-B9B4-32B8712A0CD6}" type="presOf" srcId="{0FF773E1-C96E-4AB1-B9A9-EF4CF8F907A4}" destId="{BF18C4AC-2782-410F-BC95-8DEB6B84928B}" srcOrd="1" destOrd="0" presId="urn:microsoft.com/office/officeart/2009/3/layout/HorizontalOrganizationChart"/>
-    <dgm:cxn modelId="{471F5016-4420-49E7-8BF9-E674665B5927}" srcId="{D6ED44A7-7F6F-46E4-B6F1-57C31B1EA930}" destId="{857DA822-E89F-49E3-9558-BC9A614B7B2E}" srcOrd="0" destOrd="0" parTransId="{3130A0F9-2C80-4888-A0C9-BD7B53FAF9E9}" sibTransId="{3D4C13FA-25EC-40D6-9FAE-18D36E3DFC14}"/>
-    <dgm:cxn modelId="{86374C38-9FEE-4CDA-82FC-421B2507E6C4}" type="presOf" srcId="{2ECD8A08-DF71-40FA-A01B-F586233FBA82}" destId="{AAC42A15-48A2-4C47-800E-B479AA8C0B2B}" srcOrd="1" destOrd="0" presId="urn:microsoft.com/office/officeart/2009/3/layout/HorizontalOrganizationChart"/>
-    <dgm:cxn modelId="{93F7FACC-F087-4CB4-B0AF-8D529889383E}" type="presOf" srcId="{0EB40DEC-AB4B-423C-817F-A3FA48937BB2}" destId="{27E5387A-3F6D-4E9A-8133-BE50923433EA}" srcOrd="0" destOrd="0" presId="urn:microsoft.com/office/officeart/2009/3/layout/HorizontalOrganizationChart"/>
-    <dgm:cxn modelId="{C795A451-59C0-49D9-8DA9-D743FAF49CAB}" type="presOf" srcId="{5CCA39A5-AA43-421B-A4AC-6D3F5F939833}" destId="{9C460B25-69F1-4173-BEC0-A497C12DC964}" srcOrd="0" destOrd="0" presId="urn:microsoft.com/office/officeart/2009/3/layout/HorizontalOrganizationChart"/>
-    <dgm:cxn modelId="{1E00F568-A4BC-44CF-A22F-65E21A9F548E}" type="presOf" srcId="{E619505B-0727-4AD9-94DD-27734312B4D2}" destId="{9C093E2C-D988-4786-8BA4-E99EFD30835A}" srcOrd="0" destOrd="0" presId="urn:microsoft.com/office/officeart/2009/3/layout/HorizontalOrganizationChart"/>
-    <dgm:cxn modelId="{29A4B019-4974-495E-8105-263A1AD316DC}" srcId="{C9133969-69AB-43BE-BE31-E2D23F75069B}" destId="{67FB990C-EB07-4588-AD60-DFDD89551563}" srcOrd="0" destOrd="0" parTransId="{084F17B5-BA5A-4476-A651-84E34BBCBFA9}" sibTransId="{2B718C83-E80D-488C-8C26-11ECA76883D4}"/>
-    <dgm:cxn modelId="{804C8811-8501-4F4A-B54E-0A20992DF50D}" type="presOf" srcId="{FD406D31-5931-4646-8C71-73B4CF38DCC1}" destId="{5291B87A-FB1B-4C43-B091-59599DD56257}" srcOrd="1" destOrd="0" presId="urn:microsoft.com/office/officeart/2009/3/layout/HorizontalOrganizationChart"/>
-    <dgm:cxn modelId="{9C68EFC6-3F2F-48FF-AB47-8640CC904C5D}" srcId="{78CC48EC-45BA-46FE-9542-E311EC77FAAB}" destId="{05CE3A32-3FE4-44BC-9178-1254A9E9480D}" srcOrd="1" destOrd="0" parTransId="{C0CD9D81-9BCB-491F-BE0D-6994DEAFDDD4}" sibTransId="{7E6C0FDD-8108-4218-B1C9-A905C5D62A9B}"/>
-    <dgm:cxn modelId="{F9B39CDA-C7A9-4104-985A-2111EC91FABA}" type="presOf" srcId="{8D73D8C2-DE10-40A8-BDEC-4778DEAA1CA2}" destId="{4321AD13-1A8A-4AFE-B72B-E6BEC196FA0E}" srcOrd="0" destOrd="0" presId="urn:microsoft.com/office/officeart/2009/3/layout/HorizontalOrganizationChart"/>
-    <dgm:cxn modelId="{1764B4FC-D953-44E4-AD08-1B9D4E9F6F9C}" type="presOf" srcId="{D6ED44A7-7F6F-46E4-B6F1-57C31B1EA930}" destId="{C47D9D74-077A-4270-8F54-ADC2F7D319F0}" srcOrd="0" destOrd="0" presId="urn:microsoft.com/office/officeart/2009/3/layout/HorizontalOrganizationChart"/>
-    <dgm:cxn modelId="{7C42EE38-45A4-4D75-AEB0-DE88B2450EB2}" type="presOf" srcId="{F8D70772-4A77-4E16-80CB-DA089D5EFA19}" destId="{38FDAF18-81E3-4DFF-BE63-082F9C4C72C4}" srcOrd="0" destOrd="0" presId="urn:microsoft.com/office/officeart/2009/3/layout/HorizontalOrganizationChart"/>
-    <dgm:cxn modelId="{EF6AB380-30D1-44C7-B056-FF3F9B01E8C7}" srcId="{F8D70772-4A77-4E16-80CB-DA089D5EFA19}" destId="{78CC48EC-45BA-46FE-9542-E311EC77FAAB}" srcOrd="1" destOrd="0" parTransId="{0EB40DEC-AB4B-423C-817F-A3FA48937BB2}" sibTransId="{4324AC2F-8964-4125-9517-0516F218221C}"/>
-    <dgm:cxn modelId="{75368CE1-1DE2-4A88-9FE3-528D52BF4EB7}" type="presOf" srcId="{88EFA125-05CC-43FF-9382-13FC646F67B2}" destId="{CADC30DF-8160-4509-8C15-BF7632A67781}" srcOrd="0" destOrd="0" presId="urn:microsoft.com/office/officeart/2009/3/layout/HorizontalOrganizationChart"/>
-    <dgm:cxn modelId="{289DA290-9482-4BE1-AB3D-3B3602B9AF67}" type="presOf" srcId="{AE155577-13EB-4D2B-AD53-FB46DA52F5DF}" destId="{96E4140D-7BC6-4CF4-8A2E-30DA3C63051E}" srcOrd="0" destOrd="0" presId="urn:microsoft.com/office/officeart/2009/3/layout/HorizontalOrganizationChart"/>
-    <dgm:cxn modelId="{40466397-9052-49E3-8D79-E96BC9C05C50}" type="presOf" srcId="{38968339-7F3A-46F7-A0DF-21D6E4D335F5}" destId="{4EF42A86-04CE-4D55-9010-010D37235E08}" srcOrd="0" destOrd="0" presId="urn:microsoft.com/office/officeart/2009/3/layout/HorizontalOrganizationChart"/>
-    <dgm:cxn modelId="{BBB8537E-E0B7-49D0-B5DB-DE12FA455F3B}" type="presOf" srcId="{8C578C9C-B54F-436D-BB12-96FC1AD615C2}" destId="{787AE355-14AF-486A-8568-8A9436A10A8C}" srcOrd="0" destOrd="0" presId="urn:microsoft.com/office/officeart/2009/3/layout/HorizontalOrganizationChart"/>
-    <dgm:cxn modelId="{0AAF3040-5330-4BA4-9382-C4EC67C98326}" srcId="{F8D70772-4A77-4E16-80CB-DA089D5EFA19}" destId="{88EFA125-05CC-43FF-9382-13FC646F67B2}" srcOrd="2" destOrd="0" parTransId="{5A7580D2-0209-4D98-B1A6-14A092E99EBB}" sibTransId="{95BAAD03-6602-4822-AF8D-CBAEE9977A9F}"/>
-    <dgm:cxn modelId="{1A604FB8-26FD-44B4-AE06-159F4522E45A}" type="presOf" srcId="{CDBF7332-6205-4D52-B388-9C190B4B867B}" destId="{62D6D41E-BE44-4D82-8C41-4FD00C439433}" srcOrd="0" destOrd="0" presId="urn:microsoft.com/office/officeart/2009/3/layout/HorizontalOrganizationChart"/>
-    <dgm:cxn modelId="{86834B12-2CF7-4366-9029-BB5A7633FE73}" srcId="{F2970618-BA7D-4957-BDE5-4679B2612DD9}" destId="{0FF773E1-C96E-4AB1-B9A9-EF4CF8F907A4}" srcOrd="0" destOrd="0" parTransId="{63C451AF-0DE6-415D-A080-07A4496EE903}" sibTransId="{D96F5437-460D-48F3-AA08-3490752FBCB7}"/>
-    <dgm:cxn modelId="{CDA9ABAB-C1DB-4BF2-A1D2-BB196592185A}" type="presOf" srcId="{A0B61847-E55C-4873-966C-9AA2A02EC1BE}" destId="{1194A3D7-9610-48C4-81E2-1F82969AD204}" srcOrd="1" destOrd="0" presId="urn:microsoft.com/office/officeart/2009/3/layout/HorizontalOrganizationChart"/>
-    <dgm:cxn modelId="{8754E8A3-33C2-4E11-86CE-5195B0186635}" type="presOf" srcId="{05CE3A32-3FE4-44BC-9178-1254A9E9480D}" destId="{34A20C63-4852-43BF-9A21-25F9C8F93219}" srcOrd="0" destOrd="0" presId="urn:microsoft.com/office/officeart/2009/3/layout/HorizontalOrganizationChart"/>
-    <dgm:cxn modelId="{8C18E370-67BA-451B-9247-B055CE0AC30D}" srcId="{857DA822-E89F-49E3-9558-BC9A614B7B2E}" destId="{488F7D39-E327-4B3F-89C4-E40489C3D624}" srcOrd="3" destOrd="0" parTransId="{81E6A6A1-9CDF-404E-BF9F-958F8899BF8E}" sibTransId="{A669E452-6723-4D2C-AD68-A23A2A933A7F}"/>
-    <dgm:cxn modelId="{7ACF9186-9C24-4D3B-8051-B02E3DD33737}" srcId="{857DA822-E89F-49E3-9558-BC9A614B7B2E}" destId="{F2970618-BA7D-4957-BDE5-4679B2612DD9}" srcOrd="1" destOrd="0" parTransId="{054C8CB1-F3F9-4F5B-9CC5-EDD68CD3F5A9}" sibTransId="{E4049438-3F76-49C8-A33B-B40929C5E9DC}"/>
-    <dgm:cxn modelId="{9802267D-B885-4127-9ACD-619BA0C212A1}" srcId="{F5CF903E-9F6D-4B9D-900F-7D5A2A6F5F66}" destId="{4BE2BFC7-1572-45B6-983B-0818696CEC95}" srcOrd="2" destOrd="0" parTransId="{E099E485-8033-4922-9849-AD5E12FD1FFE}" sibTransId="{6AB5D3C3-68F3-4C0A-835C-4C122968EFD1}"/>
-    <dgm:cxn modelId="{F03DCA6B-6838-4395-A403-FE3D67D984E0}" type="presOf" srcId="{488F7D39-E327-4B3F-89C4-E40489C3D624}" destId="{A560513C-F005-4BFB-BDCA-1A3FC2BE876D}" srcOrd="1" destOrd="0" presId="urn:microsoft.com/office/officeart/2009/3/layout/HorizontalOrganizationChart"/>
-    <dgm:cxn modelId="{5ABE55BC-0772-40C7-8686-08171BF5C5F9}" type="presOf" srcId="{70364DBF-CEA7-4122-A7A8-502E918520A8}" destId="{667D49AF-D100-4413-B3EF-87574DAD72B6}" srcOrd="0" destOrd="0" presId="urn:microsoft.com/office/officeart/2009/3/layout/HorizontalOrganizationChart"/>
-    <dgm:cxn modelId="{D48ACB70-633E-4930-8A17-2B0549DC7960}" type="presOf" srcId="{5CCA39A5-AA43-421B-A4AC-6D3F5F939833}" destId="{23234E9C-1EA6-423F-B4AC-FFCFBD865418}" srcOrd="1" destOrd="0" presId="urn:microsoft.com/office/officeart/2009/3/layout/HorizontalOrganizationChart"/>
-    <dgm:cxn modelId="{4B078CC0-2443-4329-8A02-DFD50B6B34A6}" srcId="{78CC48EC-45BA-46FE-9542-E311EC77FAAB}" destId="{C09133D0-FEE3-4845-BA79-F04FA509353C}" srcOrd="2" destOrd="0" parTransId="{9E08F495-C4AE-4F28-A386-0A8DEFC6BBBD}" sibTransId="{5014C75D-6816-4098-B900-06692FD04FCB}"/>
-    <dgm:cxn modelId="{16AA8561-D560-4146-AB36-17E2D9F8F02E}" srcId="{875D4011-7CFD-448C-A3CC-4436BCC3F09E}" destId="{8ECA2497-3DC6-4A44-8884-CA5E84A50CD2}" srcOrd="1" destOrd="0" parTransId="{FB4FB845-B5E1-4676-A9C9-FDF074DB573D}" sibTransId="{FEBB23C4-6D8D-4A20-9C96-C885227EF16F}"/>
-    <dgm:cxn modelId="{10104562-274A-4271-8132-799C4DC5E123}" type="presOf" srcId="{857EF621-5CDD-4F51-A806-B7214BE7377B}" destId="{157879C1-3523-421B-B20F-A0717CC4CA21}" srcOrd="0" destOrd="0" presId="urn:microsoft.com/office/officeart/2009/3/layout/HorizontalOrganizationChart"/>
     <dgm:cxn modelId="{5EFD700A-4F1D-4BE0-A418-C7A8D1E9C6F8}" type="presParOf" srcId="{8CFE662F-F699-4FA0-93BA-75BAC7617AD2}" destId="{0C1635AD-471F-4900-A0FA-9F30DF5EE794}" srcOrd="0" destOrd="0" presId="urn:microsoft.com/office/officeart/2009/3/layout/HorizontalOrganizationChart"/>
     <dgm:cxn modelId="{2DF7055F-2DAF-43A6-A40C-420F5B9019CD}" type="presParOf" srcId="{0C1635AD-471F-4900-A0FA-9F30DF5EE794}" destId="{C626BFC5-6DDD-4376-8068-EB36861ACB9E}" srcOrd="0" destOrd="0" presId="urn:microsoft.com/office/officeart/2009/3/layout/HorizontalOrganizationChart"/>
     <dgm:cxn modelId="{7B429A32-0B54-4410-9B44-3757E9F343C0}" type="presParOf" srcId="{C626BFC5-6DDD-4376-8068-EB36861ACB9E}" destId="{D43AE39C-CD89-460F-A4BA-01CA5A27EBA2}" srcOrd="0" destOrd="0" presId="urn:microsoft.com/office/officeart/2009/3/layout/HorizontalOrganizationChart"/>
@@ -15565,7 +15569,7 @@
           <a:p>
             <a:fld id="{74912BF5-3CE8-4C37-91FB-A0395D0A66B5}" type="datetimeFigureOut">
               <a:rPr lang="en-US" smtClean="0"/>
-              <a:t>24.11.2015</a:t>
+              <a:t>14.03.2016</a:t>
             </a:fld>
             <a:endParaRPr lang="en-US"/>
           </a:p>
@@ -16014,7 +16018,7 @@
           <a:p>
             <a:fld id="{187C94DF-445A-4152-97FC-0389E06F6D85}" type="datetimeFigureOut">
               <a:rPr lang="en-US" smtClean="0"/>
-              <a:t>24.11.2015</a:t>
+              <a:t>14.03.2016</a:t>
             </a:fld>
             <a:endParaRPr lang="en-US"/>
           </a:p>
@@ -16184,7 +16188,7 @@
           <a:p>
             <a:fld id="{187C94DF-445A-4152-97FC-0389E06F6D85}" type="datetimeFigureOut">
               <a:rPr lang="en-US" smtClean="0"/>
-              <a:t>24.11.2015</a:t>
+              <a:t>14.03.2016</a:t>
             </a:fld>
             <a:endParaRPr lang="en-US"/>
           </a:p>
@@ -16364,7 +16368,7 @@
           <a:p>
             <a:fld id="{187C94DF-445A-4152-97FC-0389E06F6D85}" type="datetimeFigureOut">
               <a:rPr lang="en-US" smtClean="0"/>
-              <a:t>24.11.2015</a:t>
+              <a:t>14.03.2016</a:t>
             </a:fld>
             <a:endParaRPr lang="en-US"/>
           </a:p>
@@ -16534,7 +16538,7 @@
           <a:p>
             <a:fld id="{187C94DF-445A-4152-97FC-0389E06F6D85}" type="datetimeFigureOut">
               <a:rPr lang="en-US" smtClean="0"/>
-              <a:t>24.11.2015</a:t>
+              <a:t>14.03.2016</a:t>
             </a:fld>
             <a:endParaRPr lang="en-US"/>
           </a:p>
@@ -16780,7 +16784,7 @@
           <a:p>
             <a:fld id="{187C94DF-445A-4152-97FC-0389E06F6D85}" type="datetimeFigureOut">
               <a:rPr lang="en-US" smtClean="0"/>
-              <a:t>24.11.2015</a:t>
+              <a:t>14.03.2016</a:t>
             </a:fld>
             <a:endParaRPr lang="en-US"/>
           </a:p>
@@ -17068,7 +17072,7 @@
           <a:p>
             <a:fld id="{187C94DF-445A-4152-97FC-0389E06F6D85}" type="datetimeFigureOut">
               <a:rPr lang="en-US" smtClean="0"/>
-              <a:t>24.11.2015</a:t>
+              <a:t>14.03.2016</a:t>
             </a:fld>
             <a:endParaRPr lang="en-US"/>
           </a:p>
@@ -17490,7 +17494,7 @@
           <a:p>
             <a:fld id="{187C94DF-445A-4152-97FC-0389E06F6D85}" type="datetimeFigureOut">
               <a:rPr lang="en-US" smtClean="0"/>
-              <a:t>24.11.2015</a:t>
+              <a:t>14.03.2016</a:t>
             </a:fld>
             <a:endParaRPr lang="en-US"/>
           </a:p>
@@ -17608,7 +17612,7 @@
           <a:p>
             <a:fld id="{187C94DF-445A-4152-97FC-0389E06F6D85}" type="datetimeFigureOut">
               <a:rPr lang="en-US" smtClean="0"/>
-              <a:t>24.11.2015</a:t>
+              <a:t>14.03.2016</a:t>
             </a:fld>
             <a:endParaRPr lang="en-US"/>
           </a:p>
@@ -17703,7 +17707,7 @@
           <a:p>
             <a:fld id="{187C94DF-445A-4152-97FC-0389E06F6D85}" type="datetimeFigureOut">
               <a:rPr lang="en-US" smtClean="0"/>
-              <a:t>24.11.2015</a:t>
+              <a:t>14.03.2016</a:t>
             </a:fld>
             <a:endParaRPr lang="en-US"/>
           </a:p>
@@ -17980,7 +17984,7 @@
           <a:p>
             <a:fld id="{187C94DF-445A-4152-97FC-0389E06F6D85}" type="datetimeFigureOut">
               <a:rPr lang="en-US" smtClean="0"/>
-              <a:t>24.11.2015</a:t>
+              <a:t>14.03.2016</a:t>
             </a:fld>
             <a:endParaRPr lang="en-US"/>
           </a:p>
@@ -18233,7 +18237,7 @@
           <a:p>
             <a:fld id="{187C94DF-445A-4152-97FC-0389E06F6D85}" type="datetimeFigureOut">
               <a:rPr lang="en-US" smtClean="0"/>
-              <a:t>24.11.2015</a:t>
+              <a:t>14.03.2016</a:t>
             </a:fld>
             <a:endParaRPr lang="en-US"/>
           </a:p>
@@ -18446,7 +18450,7 @@
           <a:p>
             <a:fld id="{187C94DF-445A-4152-97FC-0389E06F6D85}" type="datetimeFigureOut">
               <a:rPr lang="en-US" smtClean="0"/>
-              <a:t>24.11.2015</a:t>
+              <a:t>14.03.2016</a:t>
             </a:fld>
             <a:endParaRPr lang="en-US"/>
           </a:p>

</xml_diff>